<commit_message>
Adding files for todays class.
</commit_message>
<xml_diff>
--- a/02_05_2025/CSCI391_Microservices_Chapter4_MicroserviceCommunicationStyles_02_05_2025.pptx
+++ b/02_05_2025/CSCI391_Microservices_Chapter4_MicroserviceCommunicationStyles_02_05_2025.pptx
@@ -16,6 +16,14 @@
     <p:sldId id="264" r:id="rId10"/>
     <p:sldId id="265" r:id="rId11"/>
     <p:sldId id="266" r:id="rId12"/>
+    <p:sldId id="267" r:id="rId13"/>
+    <p:sldId id="268" r:id="rId14"/>
+    <p:sldId id="269" r:id="rId15"/>
+    <p:sldId id="270" r:id="rId16"/>
+    <p:sldId id="271" r:id="rId17"/>
+    <p:sldId id="272" r:id="rId18"/>
+    <p:sldId id="273" r:id="rId19"/>
+    <p:sldId id="274" r:id="rId20"/>
   </p:sldIdLst>
   <p:sldSz cx="12192000" cy="6858000"/>
   <p:notesSz cx="6858000" cy="9144000"/>
@@ -269,7 +277,7 @@
           <a:p>
             <a:fld id="{B19C866D-C2AE-4F94-ABEF-32D981FCA80E}" type="datetimeFigureOut">
               <a:rPr lang="en-US" smtClean="0"/>
-              <a:t>2/4/2025</a:t>
+              <a:t>2/6/2025</a:t>
             </a:fld>
             <a:endParaRPr lang="en-US"/>
           </a:p>
@@ -467,7 +475,7 @@
           <a:p>
             <a:fld id="{B19C866D-C2AE-4F94-ABEF-32D981FCA80E}" type="datetimeFigureOut">
               <a:rPr lang="en-US" smtClean="0"/>
-              <a:t>2/4/2025</a:t>
+              <a:t>2/6/2025</a:t>
             </a:fld>
             <a:endParaRPr lang="en-US"/>
           </a:p>
@@ -675,7 +683,7 @@
           <a:p>
             <a:fld id="{B19C866D-C2AE-4F94-ABEF-32D981FCA80E}" type="datetimeFigureOut">
               <a:rPr lang="en-US" smtClean="0"/>
-              <a:t>2/4/2025</a:t>
+              <a:t>2/6/2025</a:t>
             </a:fld>
             <a:endParaRPr lang="en-US"/>
           </a:p>
@@ -873,7 +881,7 @@
           <a:p>
             <a:fld id="{B19C866D-C2AE-4F94-ABEF-32D981FCA80E}" type="datetimeFigureOut">
               <a:rPr lang="en-US" smtClean="0"/>
-              <a:t>2/4/2025</a:t>
+              <a:t>2/6/2025</a:t>
             </a:fld>
             <a:endParaRPr lang="en-US"/>
           </a:p>
@@ -1148,7 +1156,7 @@
           <a:p>
             <a:fld id="{B19C866D-C2AE-4F94-ABEF-32D981FCA80E}" type="datetimeFigureOut">
               <a:rPr lang="en-US" smtClean="0"/>
-              <a:t>2/4/2025</a:t>
+              <a:t>2/6/2025</a:t>
             </a:fld>
             <a:endParaRPr lang="en-US"/>
           </a:p>
@@ -1413,7 +1421,7 @@
           <a:p>
             <a:fld id="{B19C866D-C2AE-4F94-ABEF-32D981FCA80E}" type="datetimeFigureOut">
               <a:rPr lang="en-US" smtClean="0"/>
-              <a:t>2/4/2025</a:t>
+              <a:t>2/6/2025</a:t>
             </a:fld>
             <a:endParaRPr lang="en-US"/>
           </a:p>
@@ -1825,7 +1833,7 @@
           <a:p>
             <a:fld id="{B19C866D-C2AE-4F94-ABEF-32D981FCA80E}" type="datetimeFigureOut">
               <a:rPr lang="en-US" smtClean="0"/>
-              <a:t>2/4/2025</a:t>
+              <a:t>2/6/2025</a:t>
             </a:fld>
             <a:endParaRPr lang="en-US"/>
           </a:p>
@@ -1966,7 +1974,7 @@
           <a:p>
             <a:fld id="{B19C866D-C2AE-4F94-ABEF-32D981FCA80E}" type="datetimeFigureOut">
               <a:rPr lang="en-US" smtClean="0"/>
-              <a:t>2/4/2025</a:t>
+              <a:t>2/6/2025</a:t>
             </a:fld>
             <a:endParaRPr lang="en-US"/>
           </a:p>
@@ -2079,7 +2087,7 @@
           <a:p>
             <a:fld id="{B19C866D-C2AE-4F94-ABEF-32D981FCA80E}" type="datetimeFigureOut">
               <a:rPr lang="en-US" smtClean="0"/>
-              <a:t>2/4/2025</a:t>
+              <a:t>2/6/2025</a:t>
             </a:fld>
             <a:endParaRPr lang="en-US"/>
           </a:p>
@@ -2390,7 +2398,7 @@
           <a:p>
             <a:fld id="{B19C866D-C2AE-4F94-ABEF-32D981FCA80E}" type="datetimeFigureOut">
               <a:rPr lang="en-US" smtClean="0"/>
-              <a:t>2/4/2025</a:t>
+              <a:t>2/6/2025</a:t>
             </a:fld>
             <a:endParaRPr lang="en-US"/>
           </a:p>
@@ -2678,7 +2686,7 @@
           <a:p>
             <a:fld id="{B19C866D-C2AE-4F94-ABEF-32D981FCA80E}" type="datetimeFigureOut">
               <a:rPr lang="en-US" smtClean="0"/>
-              <a:t>2/4/2025</a:t>
+              <a:t>2/6/2025</a:t>
             </a:fld>
             <a:endParaRPr lang="en-US"/>
           </a:p>
@@ -2919,7 +2927,7 @@
           <a:p>
             <a:fld id="{B19C866D-C2AE-4F94-ABEF-32D981FCA80E}" type="datetimeFigureOut">
               <a:rPr lang="en-US" smtClean="0"/>
-              <a:t>2/4/2025</a:t>
+              <a:t>2/6/2025</a:t>
             </a:fld>
             <a:endParaRPr lang="en-US"/>
           </a:p>
@@ -4306,6 +4314,3654 @@
 </p:sld>
 </file>
 
+<file path=ppt/slides/slide12.xml><?xml version="1.0" encoding="utf-8"?>
+<p:sld xmlns:a="http://schemas.openxmlformats.org/drawingml/2006/main" xmlns:r="http://schemas.openxmlformats.org/officeDocument/2006/relationships" xmlns:p="http://schemas.openxmlformats.org/presentationml/2006/main">
+  <p:cSld>
+    <p:spTree>
+      <p:nvGrpSpPr>
+        <p:cNvPr id="1" name=""/>
+        <p:cNvGrpSpPr/>
+        <p:nvPr/>
+      </p:nvGrpSpPr>
+      <p:grpSpPr>
+        <a:xfrm>
+          <a:off x="0" y="0"/>
+          <a:ext cx="0" cy="0"/>
+          <a:chOff x="0" y="0"/>
+          <a:chExt cx="0" cy="0"/>
+        </a:xfrm>
+      </p:grpSpPr>
+      <p:sp>
+        <p:nvSpPr>
+          <p:cNvPr id="5" name="TextBox 4">
+            <a:extLst>
+              <a:ext uri="{FF2B5EF4-FFF2-40B4-BE49-F238E27FC236}">
+                <a16:creationId xmlns:a16="http://schemas.microsoft.com/office/drawing/2014/main" id="{64E3C0AA-851A-B639-3479-EEBBF902688C}"/>
+              </a:ext>
+            </a:extLst>
+          </p:cNvPr>
+          <p:cNvSpPr txBox="1"/>
+          <p:nvPr/>
+        </p:nvSpPr>
+        <p:spPr>
+          <a:xfrm>
+            <a:off x="401714" y="370187"/>
+            <a:ext cx="6094520" cy="369332"/>
+          </a:xfrm>
+          <a:prstGeom prst="rect">
+            <a:avLst/>
+          </a:prstGeom>
+          <a:noFill/>
+        </p:spPr>
+        <p:txBody>
+          <a:bodyPr wrap="square">
+            <a:spAutoFit/>
+          </a:bodyPr>
+          <a:lstStyle/>
+          <a:p>
+            <a:r>
+              <a:rPr lang="en-US" sz="1800" b="1" i="0" u="none" strike="noStrike" baseline="0" dirty="0">
+                <a:solidFill>
+                  <a:srgbClr val="8F0012"/>
+                </a:solidFill>
+                <a:latin typeface="LiberationSans-Bold"/>
+              </a:rPr>
+              <a:t>Pattern: Communication Through Common Data</a:t>
+            </a:r>
+            <a:endParaRPr lang="en-US" dirty="0"/>
+          </a:p>
+        </p:txBody>
+      </p:sp>
+      <p:sp>
+        <p:nvSpPr>
+          <p:cNvPr id="7" name="TextBox 6">
+            <a:extLst>
+              <a:ext uri="{FF2B5EF4-FFF2-40B4-BE49-F238E27FC236}">
+                <a16:creationId xmlns:a16="http://schemas.microsoft.com/office/drawing/2014/main" id="{74FD8BC7-2C2D-AA87-2132-15358FFB7788}"/>
+              </a:ext>
+            </a:extLst>
+          </p:cNvPr>
+          <p:cNvSpPr txBox="1"/>
+          <p:nvPr/>
+        </p:nvSpPr>
+        <p:spPr>
+          <a:xfrm>
+            <a:off x="401714" y="739519"/>
+            <a:ext cx="6096000" cy="923330"/>
+          </a:xfrm>
+          <a:prstGeom prst="rect">
+            <a:avLst/>
+          </a:prstGeom>
+          <a:noFill/>
+        </p:spPr>
+        <p:txBody>
+          <a:bodyPr wrap="square">
+            <a:spAutoFit/>
+          </a:bodyPr>
+          <a:lstStyle/>
+          <a:p>
+            <a:pPr algn="l"/>
+            <a:r>
+              <a:rPr lang="en-US" sz="1800" b="0" i="0" u="none" strike="noStrike" baseline="0" dirty="0">
+                <a:latin typeface="LiberationSerif"/>
+              </a:rPr>
+              <a:t>used when one microservice puts data into a defined location, and another microservice (or potentially multiple microservices) then makes use of the data</a:t>
+            </a:r>
+            <a:endParaRPr lang="en-US" dirty="0"/>
+          </a:p>
+        </p:txBody>
+      </p:sp>
+      <p:pic>
+        <p:nvPicPr>
+          <p:cNvPr id="9" name="Picture 8">
+            <a:extLst>
+              <a:ext uri="{FF2B5EF4-FFF2-40B4-BE49-F238E27FC236}">
+                <a16:creationId xmlns:a16="http://schemas.microsoft.com/office/drawing/2014/main" id="{7E87401B-77DF-7B5E-9465-AC2B312A6E74}"/>
+              </a:ext>
+            </a:extLst>
+          </p:cNvPr>
+          <p:cNvPicPr>
+            <a:picLocks noChangeAspect="1"/>
+          </p:cNvPicPr>
+          <p:nvPr/>
+        </p:nvPicPr>
+        <p:blipFill>
+          <a:blip r:embed="rId2"/>
+          <a:stretch>
+            <a:fillRect/>
+          </a:stretch>
+        </p:blipFill>
+        <p:spPr>
+          <a:xfrm>
+            <a:off x="6496234" y="370187"/>
+            <a:ext cx="2857500" cy="2038350"/>
+          </a:xfrm>
+          <a:prstGeom prst="rect">
+            <a:avLst/>
+          </a:prstGeom>
+        </p:spPr>
+      </p:pic>
+      <p:sp>
+        <p:nvSpPr>
+          <p:cNvPr id="11" name="TextBox 10">
+            <a:extLst>
+              <a:ext uri="{FF2B5EF4-FFF2-40B4-BE49-F238E27FC236}">
+                <a16:creationId xmlns:a16="http://schemas.microsoft.com/office/drawing/2014/main" id="{EC0BF698-2BF5-5E77-022E-064FC9D61C41}"/>
+              </a:ext>
+            </a:extLst>
+          </p:cNvPr>
+          <p:cNvSpPr txBox="1"/>
+          <p:nvPr/>
+        </p:nvSpPr>
+        <p:spPr>
+          <a:xfrm>
+            <a:off x="400974" y="2032181"/>
+            <a:ext cx="6096000" cy="646331"/>
+          </a:xfrm>
+          <a:prstGeom prst="rect">
+            <a:avLst/>
+          </a:prstGeom>
+          <a:noFill/>
+        </p:spPr>
+        <p:txBody>
+          <a:bodyPr wrap="square">
+            <a:spAutoFit/>
+          </a:bodyPr>
+          <a:lstStyle/>
+          <a:p>
+            <a:pPr algn="l"/>
+            <a:r>
+              <a:rPr lang="en-US" sz="1800" b="0" i="0" u="none" strike="noStrike" baseline="0" dirty="0">
+                <a:latin typeface="LiberationSerif"/>
+              </a:rPr>
+              <a:t>most common general inter-process communication pattern that you’ll see</a:t>
+            </a:r>
+            <a:endParaRPr lang="en-US" dirty="0"/>
+          </a:p>
+        </p:txBody>
+      </p:sp>
+      <p:sp>
+        <p:nvSpPr>
+          <p:cNvPr id="13" name="TextBox 12">
+            <a:extLst>
+              <a:ext uri="{FF2B5EF4-FFF2-40B4-BE49-F238E27FC236}">
+                <a16:creationId xmlns:a16="http://schemas.microsoft.com/office/drawing/2014/main" id="{0325454F-DC99-F2AE-CC8A-E787EEAF58F3}"/>
+              </a:ext>
+            </a:extLst>
+          </p:cNvPr>
+          <p:cNvSpPr txBox="1"/>
+          <p:nvPr/>
+        </p:nvSpPr>
+        <p:spPr>
+          <a:xfrm>
+            <a:off x="400155" y="3047844"/>
+            <a:ext cx="6096000" cy="369332"/>
+          </a:xfrm>
+          <a:prstGeom prst="rect">
+            <a:avLst/>
+          </a:prstGeom>
+          <a:noFill/>
+        </p:spPr>
+        <p:txBody>
+          <a:bodyPr wrap="square">
+            <a:spAutoFit/>
+          </a:bodyPr>
+          <a:lstStyle/>
+          <a:p>
+            <a:r>
+              <a:rPr lang="en-US" sz="1800" b="1" i="0" u="none" strike="noStrike" baseline="0" dirty="0">
+                <a:latin typeface="LiberationSans-Bold"/>
+              </a:rPr>
+              <a:t>Implementation</a:t>
+            </a:r>
+            <a:endParaRPr lang="en-US" dirty="0"/>
+          </a:p>
+        </p:txBody>
+      </p:sp>
+      <p:sp>
+        <p:nvSpPr>
+          <p:cNvPr id="15" name="TextBox 14">
+            <a:extLst>
+              <a:ext uri="{FF2B5EF4-FFF2-40B4-BE49-F238E27FC236}">
+                <a16:creationId xmlns:a16="http://schemas.microsoft.com/office/drawing/2014/main" id="{B87D66AE-7652-1ECE-7716-6BD496E9B14A}"/>
+              </a:ext>
+            </a:extLst>
+          </p:cNvPr>
+          <p:cNvSpPr txBox="1"/>
+          <p:nvPr/>
+        </p:nvSpPr>
+        <p:spPr>
+          <a:xfrm>
+            <a:off x="400155" y="3440825"/>
+            <a:ext cx="6096000" cy="369332"/>
+          </a:xfrm>
+          <a:prstGeom prst="rect">
+            <a:avLst/>
+          </a:prstGeom>
+          <a:noFill/>
+        </p:spPr>
+        <p:txBody>
+          <a:bodyPr wrap="square">
+            <a:spAutoFit/>
+          </a:bodyPr>
+          <a:lstStyle/>
+          <a:p>
+            <a:r>
+              <a:rPr lang="en-US" sz="1800" b="0" i="0" u="none" strike="noStrike" baseline="0" dirty="0">
+                <a:latin typeface="LiberationSerif"/>
+              </a:rPr>
+              <a:t>need some sort of persistent store for the data</a:t>
+            </a:r>
+            <a:endParaRPr lang="en-US" dirty="0"/>
+          </a:p>
+        </p:txBody>
+      </p:sp>
+      <p:sp>
+        <p:nvSpPr>
+          <p:cNvPr id="17" name="TextBox 16">
+            <a:extLst>
+              <a:ext uri="{FF2B5EF4-FFF2-40B4-BE49-F238E27FC236}">
+                <a16:creationId xmlns:a16="http://schemas.microsoft.com/office/drawing/2014/main" id="{4FFCE97F-E938-04EA-2511-11B4FC1C98DD}"/>
+              </a:ext>
+            </a:extLst>
+          </p:cNvPr>
+          <p:cNvSpPr txBox="1"/>
+          <p:nvPr/>
+        </p:nvSpPr>
+        <p:spPr>
+          <a:xfrm>
+            <a:off x="400155" y="3837570"/>
+            <a:ext cx="6096000" cy="923330"/>
+          </a:xfrm>
+          <a:prstGeom prst="rect">
+            <a:avLst/>
+          </a:prstGeom>
+          <a:noFill/>
+        </p:spPr>
+        <p:txBody>
+          <a:bodyPr wrap="square">
+            <a:spAutoFit/>
+          </a:bodyPr>
+          <a:lstStyle/>
+          <a:p>
+            <a:pPr algn="l"/>
+            <a:r>
+              <a:rPr lang="en-US" sz="1800" b="0" i="0" u="none" strike="noStrike" baseline="0" dirty="0">
+                <a:latin typeface="LiberationSerif"/>
+              </a:rPr>
+              <a:t>any downstream microservice that is going to act on this data will need its own mechanism to identify that new data is available (polling is common)</a:t>
+            </a:r>
+            <a:endParaRPr lang="en-US" dirty="0"/>
+          </a:p>
+        </p:txBody>
+      </p:sp>
+      <p:sp>
+        <p:nvSpPr>
+          <p:cNvPr id="19" name="TextBox 18">
+            <a:extLst>
+              <a:ext uri="{FF2B5EF4-FFF2-40B4-BE49-F238E27FC236}">
+                <a16:creationId xmlns:a16="http://schemas.microsoft.com/office/drawing/2014/main" id="{7D41C33B-444F-3A2F-C495-EAEF7D554FF4}"/>
+              </a:ext>
+            </a:extLst>
+          </p:cNvPr>
+          <p:cNvSpPr txBox="1"/>
+          <p:nvPr/>
+        </p:nvSpPr>
+        <p:spPr>
+          <a:xfrm>
+            <a:off x="400155" y="5055529"/>
+            <a:ext cx="6096000" cy="369332"/>
+          </a:xfrm>
+          <a:prstGeom prst="rect">
+            <a:avLst/>
+          </a:prstGeom>
+          <a:noFill/>
+        </p:spPr>
+        <p:txBody>
+          <a:bodyPr wrap="square">
+            <a:spAutoFit/>
+          </a:bodyPr>
+          <a:lstStyle/>
+          <a:p>
+            <a:r>
+              <a:rPr lang="en-US" sz="1800" b="0" i="0" u="none" strike="noStrike" baseline="0" dirty="0">
+                <a:latin typeface="LiberationSerif"/>
+              </a:rPr>
+              <a:t>data lake and the data warehouse (two common examples)</a:t>
+            </a:r>
+            <a:endParaRPr lang="en-US" dirty="0"/>
+          </a:p>
+        </p:txBody>
+      </p:sp>
+      <p:sp>
+        <p:nvSpPr>
+          <p:cNvPr id="21" name="TextBox 20">
+            <a:extLst>
+              <a:ext uri="{FF2B5EF4-FFF2-40B4-BE49-F238E27FC236}">
+                <a16:creationId xmlns:a16="http://schemas.microsoft.com/office/drawing/2014/main" id="{E2780A7D-D8C1-1221-AB45-8EF382A7B318}"/>
+              </a:ext>
+            </a:extLst>
+          </p:cNvPr>
+          <p:cNvSpPr txBox="1"/>
+          <p:nvPr/>
+        </p:nvSpPr>
+        <p:spPr>
+          <a:xfrm>
+            <a:off x="400155" y="5457839"/>
+            <a:ext cx="6096000" cy="646331"/>
+          </a:xfrm>
+          <a:prstGeom prst="rect">
+            <a:avLst/>
+          </a:prstGeom>
+          <a:noFill/>
+        </p:spPr>
+        <p:txBody>
+          <a:bodyPr wrap="square">
+            <a:spAutoFit/>
+          </a:bodyPr>
+          <a:lstStyle/>
+          <a:p>
+            <a:pPr algn="l"/>
+            <a:r>
+              <a:rPr lang="en-US" sz="1800" b="0" i="0" u="none" strike="noStrike" baseline="0" dirty="0">
+                <a:latin typeface="LiberationSerif"/>
+              </a:rPr>
+              <a:t>assumption is that the flow of information is in a single direction (avoid the situation of common coupling)</a:t>
+            </a:r>
+            <a:endParaRPr lang="en-US" dirty="0"/>
+          </a:p>
+        </p:txBody>
+      </p:sp>
+      <p:pic>
+        <p:nvPicPr>
+          <p:cNvPr id="23" name="Picture 22">
+            <a:extLst>
+              <a:ext uri="{FF2B5EF4-FFF2-40B4-BE49-F238E27FC236}">
+                <a16:creationId xmlns:a16="http://schemas.microsoft.com/office/drawing/2014/main" id="{BD01BA14-4BBD-25CE-FC57-04518FB97E8B}"/>
+              </a:ext>
+            </a:extLst>
+          </p:cNvPr>
+          <p:cNvPicPr>
+            <a:picLocks noChangeAspect="1"/>
+          </p:cNvPicPr>
+          <p:nvPr/>
+        </p:nvPicPr>
+        <p:blipFill>
+          <a:blip r:embed="rId3"/>
+          <a:stretch>
+            <a:fillRect/>
+          </a:stretch>
+        </p:blipFill>
+        <p:spPr>
+          <a:xfrm>
+            <a:off x="6496155" y="4108550"/>
+            <a:ext cx="4174146" cy="2379263"/>
+          </a:xfrm>
+          <a:prstGeom prst="rect">
+            <a:avLst/>
+          </a:prstGeom>
+        </p:spPr>
+      </p:pic>
+      <p:sp>
+        <p:nvSpPr>
+          <p:cNvPr id="25" name="TextBox 24">
+            <a:extLst>
+              <a:ext uri="{FF2B5EF4-FFF2-40B4-BE49-F238E27FC236}">
+                <a16:creationId xmlns:a16="http://schemas.microsoft.com/office/drawing/2014/main" id="{8078118C-DCBB-0E8A-ECC3-E0851AC85312}"/>
+              </a:ext>
+            </a:extLst>
+          </p:cNvPr>
+          <p:cNvSpPr txBox="1"/>
+          <p:nvPr/>
+        </p:nvSpPr>
+        <p:spPr>
+          <a:xfrm>
+            <a:off x="400155" y="6162228"/>
+            <a:ext cx="6096000" cy="646331"/>
+          </a:xfrm>
+          <a:prstGeom prst="rect">
+            <a:avLst/>
+          </a:prstGeom>
+          <a:noFill/>
+        </p:spPr>
+        <p:txBody>
+          <a:bodyPr wrap="square">
+            <a:spAutoFit/>
+          </a:bodyPr>
+          <a:lstStyle/>
+          <a:p>
+            <a:pPr algn="l"/>
+            <a:r>
+              <a:rPr lang="en-US" sz="1800" b="0" i="0" u="none" strike="noStrike" baseline="0" dirty="0">
+                <a:latin typeface="LiberationSerif"/>
+              </a:rPr>
+              <a:t>unidirectional flow can make it easier to reason about</a:t>
+            </a:r>
+          </a:p>
+          <a:p>
+            <a:pPr algn="l"/>
+            <a:r>
+              <a:rPr lang="en-US" sz="1800" b="0" i="0" u="none" strike="noStrike" baseline="0" dirty="0">
+                <a:latin typeface="LiberationSerif"/>
+              </a:rPr>
+              <a:t>the flow of information</a:t>
+            </a:r>
+            <a:endParaRPr lang="en-US" dirty="0"/>
+          </a:p>
+        </p:txBody>
+      </p:sp>
+    </p:spTree>
+    <p:extLst>
+      <p:ext uri="{BB962C8B-B14F-4D97-AF65-F5344CB8AC3E}">
+        <p14:creationId xmlns:p14="http://schemas.microsoft.com/office/powerpoint/2010/main" val="6882547"/>
+      </p:ext>
+    </p:extLst>
+  </p:cSld>
+  <p:clrMapOvr>
+    <a:masterClrMapping/>
+  </p:clrMapOvr>
+</p:sld>
+</file>
+
+<file path=ppt/slides/slide13.xml><?xml version="1.0" encoding="utf-8"?>
+<p:sld xmlns:a="http://schemas.openxmlformats.org/drawingml/2006/main" xmlns:r="http://schemas.openxmlformats.org/officeDocument/2006/relationships" xmlns:p="http://schemas.openxmlformats.org/presentationml/2006/main">
+  <p:cSld>
+    <p:spTree>
+      <p:nvGrpSpPr>
+        <p:cNvPr id="1" name=""/>
+        <p:cNvGrpSpPr/>
+        <p:nvPr/>
+      </p:nvGrpSpPr>
+      <p:grpSpPr>
+        <a:xfrm>
+          <a:off x="0" y="0"/>
+          <a:ext cx="0" cy="0"/>
+          <a:chOff x="0" y="0"/>
+          <a:chExt cx="0" cy="0"/>
+        </a:xfrm>
+      </p:grpSpPr>
+      <p:sp>
+        <p:nvSpPr>
+          <p:cNvPr id="4" name="TextBox 3">
+            <a:extLst>
+              <a:ext uri="{FF2B5EF4-FFF2-40B4-BE49-F238E27FC236}">
+                <a16:creationId xmlns:a16="http://schemas.microsoft.com/office/drawing/2014/main" id="{BB70E1E9-B8E6-B7D6-A238-B53050D49381}"/>
+              </a:ext>
+            </a:extLst>
+          </p:cNvPr>
+          <p:cNvSpPr txBox="1"/>
+          <p:nvPr/>
+        </p:nvSpPr>
+        <p:spPr>
+          <a:xfrm>
+            <a:off x="401714" y="370187"/>
+            <a:ext cx="6094520" cy="369332"/>
+          </a:xfrm>
+          <a:prstGeom prst="rect">
+            <a:avLst/>
+          </a:prstGeom>
+          <a:noFill/>
+        </p:spPr>
+        <p:txBody>
+          <a:bodyPr wrap="square">
+            <a:spAutoFit/>
+          </a:bodyPr>
+          <a:lstStyle/>
+          <a:p>
+            <a:r>
+              <a:rPr lang="en-US" sz="1800" b="1" i="0" u="none" strike="noStrike" baseline="0" dirty="0">
+                <a:solidFill>
+                  <a:srgbClr val="8F0012"/>
+                </a:solidFill>
+                <a:latin typeface="LiberationSans-Bold"/>
+              </a:rPr>
+              <a:t>Pattern: Communication Through Common Data</a:t>
+            </a:r>
+            <a:endParaRPr lang="en-US" dirty="0"/>
+          </a:p>
+        </p:txBody>
+      </p:sp>
+      <p:sp>
+        <p:nvSpPr>
+          <p:cNvPr id="6" name="TextBox 5">
+            <a:extLst>
+              <a:ext uri="{FF2B5EF4-FFF2-40B4-BE49-F238E27FC236}">
+                <a16:creationId xmlns:a16="http://schemas.microsoft.com/office/drawing/2014/main" id="{74831F27-F7CA-1D34-2301-E849C49C9A2C}"/>
+              </a:ext>
+            </a:extLst>
+          </p:cNvPr>
+          <p:cNvSpPr txBox="1"/>
+          <p:nvPr/>
+        </p:nvSpPr>
+        <p:spPr>
+          <a:xfrm>
+            <a:off x="401714" y="739519"/>
+            <a:ext cx="6096000" cy="369332"/>
+          </a:xfrm>
+          <a:prstGeom prst="rect">
+            <a:avLst/>
+          </a:prstGeom>
+          <a:noFill/>
+        </p:spPr>
+        <p:txBody>
+          <a:bodyPr wrap="square">
+            <a:spAutoFit/>
+          </a:bodyPr>
+          <a:lstStyle/>
+          <a:p>
+            <a:r>
+              <a:rPr lang="en-US" sz="1800" b="1" i="0" u="none" strike="noStrike" baseline="0" dirty="0">
+                <a:latin typeface="LiberationSans-Bold"/>
+              </a:rPr>
+              <a:t>Advantages</a:t>
+            </a:r>
+            <a:endParaRPr lang="en-US" dirty="0"/>
+          </a:p>
+        </p:txBody>
+      </p:sp>
+      <p:sp>
+        <p:nvSpPr>
+          <p:cNvPr id="8" name="TextBox 7">
+            <a:extLst>
+              <a:ext uri="{FF2B5EF4-FFF2-40B4-BE49-F238E27FC236}">
+                <a16:creationId xmlns:a16="http://schemas.microsoft.com/office/drawing/2014/main" id="{A7AB7D4B-3A42-F01B-B02E-41A243116D46}"/>
+              </a:ext>
+            </a:extLst>
+          </p:cNvPr>
+          <p:cNvSpPr txBox="1"/>
+          <p:nvPr/>
+        </p:nvSpPr>
+        <p:spPr>
+          <a:xfrm>
+            <a:off x="400234" y="1108851"/>
+            <a:ext cx="6096000" cy="923330"/>
+          </a:xfrm>
+          <a:prstGeom prst="rect">
+            <a:avLst/>
+          </a:prstGeom>
+          <a:noFill/>
+        </p:spPr>
+        <p:txBody>
+          <a:bodyPr wrap="square">
+            <a:spAutoFit/>
+          </a:bodyPr>
+          <a:lstStyle/>
+          <a:p>
+            <a:pPr algn="l"/>
+            <a:r>
+              <a:rPr lang="en-US" sz="1800" b="0" i="0" u="none" strike="noStrike" baseline="0" dirty="0">
+                <a:latin typeface="LiberationSerif"/>
+              </a:rPr>
+              <a:t>implemented very simply, using commonly understood technology (if you can read/write to a file / database you can use this pattern)</a:t>
+            </a:r>
+            <a:endParaRPr lang="en-US" dirty="0"/>
+          </a:p>
+        </p:txBody>
+      </p:sp>
+      <p:sp>
+        <p:nvSpPr>
+          <p:cNvPr id="10" name="TextBox 9">
+            <a:extLst>
+              <a:ext uri="{FF2B5EF4-FFF2-40B4-BE49-F238E27FC236}">
+                <a16:creationId xmlns:a16="http://schemas.microsoft.com/office/drawing/2014/main" id="{0F9C6760-A4FD-0BC8-D9C5-39070B5EDC90}"/>
+              </a:ext>
+            </a:extLst>
+          </p:cNvPr>
+          <p:cNvSpPr txBox="1"/>
+          <p:nvPr/>
+        </p:nvSpPr>
+        <p:spPr>
+          <a:xfrm>
+            <a:off x="400234" y="2032181"/>
+            <a:ext cx="6096000" cy="369332"/>
+          </a:xfrm>
+          <a:prstGeom prst="rect">
+            <a:avLst/>
+          </a:prstGeom>
+          <a:noFill/>
+        </p:spPr>
+        <p:txBody>
+          <a:bodyPr wrap="square">
+            <a:spAutoFit/>
+          </a:bodyPr>
+          <a:lstStyle/>
+          <a:p>
+            <a:r>
+              <a:rPr lang="en-US" sz="1800" b="0" i="0" u="none" strike="noStrike" baseline="0" dirty="0">
+                <a:latin typeface="LiberationSerif"/>
+              </a:rPr>
+              <a:t>enables interoperability between different types of systems</a:t>
+            </a:r>
+            <a:endParaRPr lang="en-US" dirty="0"/>
+          </a:p>
+        </p:txBody>
+      </p:sp>
+      <p:sp>
+        <p:nvSpPr>
+          <p:cNvPr id="12" name="TextBox 11">
+            <a:extLst>
+              <a:ext uri="{FF2B5EF4-FFF2-40B4-BE49-F238E27FC236}">
+                <a16:creationId xmlns:a16="http://schemas.microsoft.com/office/drawing/2014/main" id="{0795D3BF-0982-1485-3E92-E7D57030CF21}"/>
+              </a:ext>
+            </a:extLst>
+          </p:cNvPr>
+          <p:cNvSpPr txBox="1"/>
+          <p:nvPr/>
+        </p:nvSpPr>
+        <p:spPr>
+          <a:xfrm>
+            <a:off x="400234" y="2401513"/>
+            <a:ext cx="6096000" cy="369332"/>
+          </a:xfrm>
+          <a:prstGeom prst="rect">
+            <a:avLst/>
+          </a:prstGeom>
+          <a:noFill/>
+        </p:spPr>
+        <p:txBody>
+          <a:bodyPr wrap="square">
+            <a:spAutoFit/>
+          </a:bodyPr>
+          <a:lstStyle/>
+          <a:p>
+            <a:pPr algn="l"/>
+            <a:r>
+              <a:rPr lang="en-US" sz="1800" b="0" i="0" u="none" strike="noStrike" baseline="0" dirty="0">
+                <a:latin typeface="LiberationSerif"/>
+              </a:rPr>
+              <a:t>sending lots of data in one big go, this pattern can work well</a:t>
+            </a:r>
+            <a:endParaRPr lang="en-US" dirty="0"/>
+          </a:p>
+        </p:txBody>
+      </p:sp>
+      <p:sp>
+        <p:nvSpPr>
+          <p:cNvPr id="14" name="TextBox 13">
+            <a:extLst>
+              <a:ext uri="{FF2B5EF4-FFF2-40B4-BE49-F238E27FC236}">
+                <a16:creationId xmlns:a16="http://schemas.microsoft.com/office/drawing/2014/main" id="{40B861B6-B54F-8A51-E155-EC3851A348DD}"/>
+              </a:ext>
+            </a:extLst>
+          </p:cNvPr>
+          <p:cNvSpPr txBox="1"/>
+          <p:nvPr/>
+        </p:nvSpPr>
+        <p:spPr>
+          <a:xfrm>
+            <a:off x="400234" y="3294511"/>
+            <a:ext cx="6096000" cy="369332"/>
+          </a:xfrm>
+          <a:prstGeom prst="rect">
+            <a:avLst/>
+          </a:prstGeom>
+          <a:noFill/>
+        </p:spPr>
+        <p:txBody>
+          <a:bodyPr wrap="square">
+            <a:spAutoFit/>
+          </a:bodyPr>
+          <a:lstStyle/>
+          <a:p>
+            <a:pPr algn="l"/>
+            <a:r>
+              <a:rPr lang="en-US" sz="1800" b="0" i="0" u="none" strike="noStrike" baseline="0" dirty="0">
+                <a:latin typeface="LiberationSerif"/>
+              </a:rPr>
+              <a:t>unlikely to be useful in low-latency situations (due to polling)</a:t>
+            </a:r>
+            <a:endParaRPr lang="en-US" dirty="0"/>
+          </a:p>
+        </p:txBody>
+      </p:sp>
+      <p:sp>
+        <p:nvSpPr>
+          <p:cNvPr id="16" name="TextBox 15">
+            <a:extLst>
+              <a:ext uri="{FF2B5EF4-FFF2-40B4-BE49-F238E27FC236}">
+                <a16:creationId xmlns:a16="http://schemas.microsoft.com/office/drawing/2014/main" id="{BEDF3400-FB31-61C2-CEAF-FB10894B61C6}"/>
+              </a:ext>
+            </a:extLst>
+          </p:cNvPr>
+          <p:cNvSpPr txBox="1"/>
+          <p:nvPr/>
+        </p:nvSpPr>
+        <p:spPr>
+          <a:xfrm>
+            <a:off x="400234" y="2925179"/>
+            <a:ext cx="6096000" cy="369332"/>
+          </a:xfrm>
+          <a:prstGeom prst="rect">
+            <a:avLst/>
+          </a:prstGeom>
+          <a:noFill/>
+        </p:spPr>
+        <p:txBody>
+          <a:bodyPr wrap="square">
+            <a:spAutoFit/>
+          </a:bodyPr>
+          <a:lstStyle/>
+          <a:p>
+            <a:r>
+              <a:rPr lang="en-US" sz="1800" b="1" i="0" u="none" strike="noStrike" baseline="0" dirty="0">
+                <a:latin typeface="LiberationSans-Bold"/>
+              </a:rPr>
+              <a:t>Disadvantages</a:t>
+            </a:r>
+            <a:endParaRPr lang="en-US" dirty="0"/>
+          </a:p>
+        </p:txBody>
+      </p:sp>
+      <p:sp>
+        <p:nvSpPr>
+          <p:cNvPr id="18" name="TextBox 17">
+            <a:extLst>
+              <a:ext uri="{FF2B5EF4-FFF2-40B4-BE49-F238E27FC236}">
+                <a16:creationId xmlns:a16="http://schemas.microsoft.com/office/drawing/2014/main" id="{69AB0AF1-A626-71EE-4FF1-8BD67C330812}"/>
+              </a:ext>
+            </a:extLst>
+          </p:cNvPr>
+          <p:cNvSpPr txBox="1"/>
+          <p:nvPr/>
+        </p:nvSpPr>
+        <p:spPr>
+          <a:xfrm>
+            <a:off x="400234" y="3663843"/>
+            <a:ext cx="6096000" cy="369332"/>
+          </a:xfrm>
+          <a:prstGeom prst="rect">
+            <a:avLst/>
+          </a:prstGeom>
+          <a:noFill/>
+        </p:spPr>
+        <p:txBody>
+          <a:bodyPr wrap="square">
+            <a:spAutoFit/>
+          </a:bodyPr>
+          <a:lstStyle/>
+          <a:p>
+            <a:r>
+              <a:rPr lang="en-US" sz="1800" b="0" i="0" u="none" strike="noStrike" baseline="0" dirty="0">
+                <a:latin typeface="LiberationSerif"/>
+              </a:rPr>
+              <a:t>common data store becomes a potential source of coupling</a:t>
+            </a:r>
+            <a:endParaRPr lang="en-US" dirty="0"/>
+          </a:p>
+        </p:txBody>
+      </p:sp>
+      <p:sp>
+        <p:nvSpPr>
+          <p:cNvPr id="20" name="TextBox 19">
+            <a:extLst>
+              <a:ext uri="{FF2B5EF4-FFF2-40B4-BE49-F238E27FC236}">
+                <a16:creationId xmlns:a16="http://schemas.microsoft.com/office/drawing/2014/main" id="{42748E71-9C12-1B77-3C8A-15C47A0B1E6D}"/>
+              </a:ext>
+            </a:extLst>
+          </p:cNvPr>
+          <p:cNvSpPr txBox="1"/>
+          <p:nvPr/>
+        </p:nvSpPr>
+        <p:spPr>
+          <a:xfrm>
+            <a:off x="400234" y="4140798"/>
+            <a:ext cx="6096000" cy="923330"/>
+          </a:xfrm>
+          <a:prstGeom prst="rect">
+            <a:avLst/>
+          </a:prstGeom>
+          <a:noFill/>
+        </p:spPr>
+        <p:txBody>
+          <a:bodyPr wrap="square">
+            <a:spAutoFit/>
+          </a:bodyPr>
+          <a:lstStyle/>
+          <a:p>
+            <a:pPr algn="l"/>
+            <a:r>
+              <a:rPr lang="en-US" sz="1800" b="0" i="0" u="none" strike="noStrike" baseline="0" dirty="0">
+                <a:latin typeface="LiberationSerif"/>
+              </a:rPr>
+              <a:t>The robustness of the communication will also come down to the robustness of the underlying data store (not necessarily a disadvantage but something to be aware of)</a:t>
+            </a:r>
+            <a:endParaRPr lang="en-US" dirty="0"/>
+          </a:p>
+        </p:txBody>
+      </p:sp>
+      <p:sp>
+        <p:nvSpPr>
+          <p:cNvPr id="22" name="TextBox 21">
+            <a:extLst>
+              <a:ext uri="{FF2B5EF4-FFF2-40B4-BE49-F238E27FC236}">
+                <a16:creationId xmlns:a16="http://schemas.microsoft.com/office/drawing/2014/main" id="{D500DB79-9C7B-A1FC-324E-0B884C488BE5}"/>
+              </a:ext>
+            </a:extLst>
+          </p:cNvPr>
+          <p:cNvSpPr txBox="1"/>
+          <p:nvPr/>
+        </p:nvSpPr>
+        <p:spPr>
+          <a:xfrm>
+            <a:off x="400234" y="5171751"/>
+            <a:ext cx="6096000" cy="369332"/>
+          </a:xfrm>
+          <a:prstGeom prst="rect">
+            <a:avLst/>
+          </a:prstGeom>
+          <a:noFill/>
+        </p:spPr>
+        <p:txBody>
+          <a:bodyPr wrap="square">
+            <a:spAutoFit/>
+          </a:bodyPr>
+          <a:lstStyle/>
+          <a:p>
+            <a:r>
+              <a:rPr lang="en-US" sz="1800" b="1" i="0" u="none" strike="noStrike" baseline="0" dirty="0">
+                <a:latin typeface="LiberationSans-Bold"/>
+              </a:rPr>
+              <a:t>Where to Use It</a:t>
+            </a:r>
+            <a:endParaRPr lang="en-US" dirty="0"/>
+          </a:p>
+        </p:txBody>
+      </p:sp>
+      <p:sp>
+        <p:nvSpPr>
+          <p:cNvPr id="24" name="TextBox 23">
+            <a:extLst>
+              <a:ext uri="{FF2B5EF4-FFF2-40B4-BE49-F238E27FC236}">
+                <a16:creationId xmlns:a16="http://schemas.microsoft.com/office/drawing/2014/main" id="{013629D1-FBFD-E0B8-8777-767B333FEBA8}"/>
+              </a:ext>
+            </a:extLst>
+          </p:cNvPr>
+          <p:cNvSpPr txBox="1"/>
+          <p:nvPr/>
+        </p:nvSpPr>
+        <p:spPr>
+          <a:xfrm>
+            <a:off x="400234" y="5541083"/>
+            <a:ext cx="6096000" cy="646331"/>
+          </a:xfrm>
+          <a:prstGeom prst="rect">
+            <a:avLst/>
+          </a:prstGeom>
+          <a:noFill/>
+        </p:spPr>
+        <p:txBody>
+          <a:bodyPr wrap="square">
+            <a:spAutoFit/>
+          </a:bodyPr>
+          <a:lstStyle/>
+          <a:p>
+            <a:pPr algn="l"/>
+            <a:r>
+              <a:rPr lang="en-US" sz="1800" b="0" i="0" u="none" strike="noStrike" baseline="0" dirty="0">
+                <a:latin typeface="LiberationSerif"/>
+              </a:rPr>
+              <a:t>enabling interoperability between processes that might have restrictions on what technology they can use</a:t>
+            </a:r>
+            <a:endParaRPr lang="en-US" dirty="0"/>
+          </a:p>
+        </p:txBody>
+      </p:sp>
+      <p:sp>
+        <p:nvSpPr>
+          <p:cNvPr id="26" name="TextBox 25">
+            <a:extLst>
+              <a:ext uri="{FF2B5EF4-FFF2-40B4-BE49-F238E27FC236}">
+                <a16:creationId xmlns:a16="http://schemas.microsoft.com/office/drawing/2014/main" id="{A0ACF185-90D3-9732-26D4-332A06F14A77}"/>
+              </a:ext>
+            </a:extLst>
+          </p:cNvPr>
+          <p:cNvSpPr txBox="1"/>
+          <p:nvPr/>
+        </p:nvSpPr>
+        <p:spPr>
+          <a:xfrm>
+            <a:off x="400234" y="6187414"/>
+            <a:ext cx="6096000" cy="369332"/>
+          </a:xfrm>
+          <a:prstGeom prst="rect">
+            <a:avLst/>
+          </a:prstGeom>
+          <a:noFill/>
+        </p:spPr>
+        <p:txBody>
+          <a:bodyPr wrap="square">
+            <a:spAutoFit/>
+          </a:bodyPr>
+          <a:lstStyle/>
+          <a:p>
+            <a:r>
+              <a:rPr lang="en-US" sz="1800" b="0" i="0" u="none" strike="noStrike" baseline="0" dirty="0">
+                <a:latin typeface="LiberationSerif"/>
+              </a:rPr>
+              <a:t>sharing large volumes of data</a:t>
+            </a:r>
+            <a:endParaRPr lang="en-US" dirty="0"/>
+          </a:p>
+        </p:txBody>
+      </p:sp>
+    </p:spTree>
+    <p:extLst>
+      <p:ext uri="{BB962C8B-B14F-4D97-AF65-F5344CB8AC3E}">
+        <p14:creationId xmlns:p14="http://schemas.microsoft.com/office/powerpoint/2010/main" val="1013978983"/>
+      </p:ext>
+    </p:extLst>
+  </p:cSld>
+  <p:clrMapOvr>
+    <a:masterClrMapping/>
+  </p:clrMapOvr>
+</p:sld>
+</file>
+
+<file path=ppt/slides/slide14.xml><?xml version="1.0" encoding="utf-8"?>
+<p:sld xmlns:a="http://schemas.openxmlformats.org/drawingml/2006/main" xmlns:r="http://schemas.openxmlformats.org/officeDocument/2006/relationships" xmlns:p="http://schemas.openxmlformats.org/presentationml/2006/main">
+  <p:cSld>
+    <p:spTree>
+      <p:nvGrpSpPr>
+        <p:cNvPr id="1" name=""/>
+        <p:cNvGrpSpPr/>
+        <p:nvPr/>
+      </p:nvGrpSpPr>
+      <p:grpSpPr>
+        <a:xfrm>
+          <a:off x="0" y="0"/>
+          <a:ext cx="0" cy="0"/>
+          <a:chOff x="0" y="0"/>
+          <a:chExt cx="0" cy="0"/>
+        </a:xfrm>
+      </p:grpSpPr>
+      <p:sp>
+        <p:nvSpPr>
+          <p:cNvPr id="5" name="TextBox 4">
+            <a:extLst>
+              <a:ext uri="{FF2B5EF4-FFF2-40B4-BE49-F238E27FC236}">
+                <a16:creationId xmlns:a16="http://schemas.microsoft.com/office/drawing/2014/main" id="{5E20311B-7378-FD42-4996-0566021A2FF5}"/>
+              </a:ext>
+            </a:extLst>
+          </p:cNvPr>
+          <p:cNvSpPr txBox="1"/>
+          <p:nvPr/>
+        </p:nvSpPr>
+        <p:spPr>
+          <a:xfrm>
+            <a:off x="433136" y="376807"/>
+            <a:ext cx="6096000" cy="369332"/>
+          </a:xfrm>
+          <a:prstGeom prst="rect">
+            <a:avLst/>
+          </a:prstGeom>
+          <a:noFill/>
+        </p:spPr>
+        <p:txBody>
+          <a:bodyPr wrap="square">
+            <a:spAutoFit/>
+          </a:bodyPr>
+          <a:lstStyle/>
+          <a:p>
+            <a:r>
+              <a:rPr lang="en-US" sz="1800" b="1" i="0" u="none" strike="noStrike" baseline="0" dirty="0">
+                <a:solidFill>
+                  <a:srgbClr val="8F0012"/>
+                </a:solidFill>
+                <a:latin typeface="LiberationSans-Bold"/>
+              </a:rPr>
+              <a:t>Pattern: Request-Response Communication</a:t>
+            </a:r>
+            <a:endParaRPr lang="en-US" dirty="0"/>
+          </a:p>
+        </p:txBody>
+      </p:sp>
+      <p:sp>
+        <p:nvSpPr>
+          <p:cNvPr id="7" name="TextBox 6">
+            <a:extLst>
+              <a:ext uri="{FF2B5EF4-FFF2-40B4-BE49-F238E27FC236}">
+                <a16:creationId xmlns:a16="http://schemas.microsoft.com/office/drawing/2014/main" id="{422AAB90-8B19-D98C-0462-04BD58842EE3}"/>
+              </a:ext>
+            </a:extLst>
+          </p:cNvPr>
+          <p:cNvSpPr txBox="1"/>
+          <p:nvPr/>
+        </p:nvSpPr>
+        <p:spPr>
+          <a:xfrm>
+            <a:off x="433136" y="746139"/>
+            <a:ext cx="6096000" cy="1200329"/>
+          </a:xfrm>
+          <a:prstGeom prst="rect">
+            <a:avLst/>
+          </a:prstGeom>
+          <a:noFill/>
+        </p:spPr>
+        <p:txBody>
+          <a:bodyPr wrap="square">
+            <a:spAutoFit/>
+          </a:bodyPr>
+          <a:lstStyle/>
+          <a:p>
+            <a:pPr algn="l"/>
+            <a:r>
+              <a:rPr lang="en-US" sz="1800" b="0" i="0" u="none" strike="noStrike" baseline="0" dirty="0">
+                <a:latin typeface="LiberationSerif"/>
+              </a:rPr>
+              <a:t>a microservice sends a request to a downstream service</a:t>
+            </a:r>
+          </a:p>
+          <a:p>
+            <a:pPr algn="l"/>
+            <a:r>
+              <a:rPr lang="en-US" sz="1800" b="0" i="0" u="none" strike="noStrike" baseline="0" dirty="0">
+                <a:latin typeface="LiberationSerif"/>
+              </a:rPr>
+              <a:t>asking it to do something and expects to receive a response with the result of the request (synchronous blocking / asynchronous nonblocking).</a:t>
+            </a:r>
+            <a:endParaRPr lang="en-US" dirty="0"/>
+          </a:p>
+        </p:txBody>
+      </p:sp>
+      <p:sp>
+        <p:nvSpPr>
+          <p:cNvPr id="11" name="TextBox 10">
+            <a:extLst>
+              <a:ext uri="{FF2B5EF4-FFF2-40B4-BE49-F238E27FC236}">
+                <a16:creationId xmlns:a16="http://schemas.microsoft.com/office/drawing/2014/main" id="{F966105C-CC8D-525B-2E73-4C6D51C6CC0E}"/>
+              </a:ext>
+            </a:extLst>
+          </p:cNvPr>
+          <p:cNvSpPr txBox="1"/>
+          <p:nvPr/>
+        </p:nvSpPr>
+        <p:spPr>
+          <a:xfrm>
+            <a:off x="433136" y="2131134"/>
+            <a:ext cx="6096000" cy="646331"/>
+          </a:xfrm>
+          <a:prstGeom prst="rect">
+            <a:avLst/>
+          </a:prstGeom>
+          <a:noFill/>
+        </p:spPr>
+        <p:txBody>
+          <a:bodyPr wrap="square">
+            <a:spAutoFit/>
+          </a:bodyPr>
+          <a:lstStyle/>
+          <a:p>
+            <a:pPr algn="l"/>
+            <a:r>
+              <a:rPr lang="en-US" sz="1800" b="0" i="0" u="none" strike="noStrike" baseline="0" dirty="0">
+                <a:latin typeface="LiberationSerif"/>
+              </a:rPr>
+              <a:t>where calls need to be completed in a certain order is</a:t>
+            </a:r>
+          </a:p>
+          <a:p>
+            <a:pPr algn="l"/>
+            <a:r>
+              <a:rPr lang="en-US" sz="1800" b="0" i="0" u="none" strike="noStrike" baseline="0" dirty="0">
+                <a:latin typeface="LiberationSerif"/>
+              </a:rPr>
+              <a:t>commonplace</a:t>
+            </a:r>
+            <a:endParaRPr lang="en-US" dirty="0"/>
+          </a:p>
+        </p:txBody>
+      </p:sp>
+      <p:sp>
+        <p:nvSpPr>
+          <p:cNvPr id="13" name="TextBox 12">
+            <a:extLst>
+              <a:ext uri="{FF2B5EF4-FFF2-40B4-BE49-F238E27FC236}">
+                <a16:creationId xmlns:a16="http://schemas.microsoft.com/office/drawing/2014/main" id="{BA5B21C9-F476-9AF1-AE04-1C049A1AB31F}"/>
+              </a:ext>
+            </a:extLst>
+          </p:cNvPr>
+          <p:cNvSpPr txBox="1"/>
+          <p:nvPr/>
+        </p:nvSpPr>
+        <p:spPr>
+          <a:xfrm>
+            <a:off x="433136" y="2962131"/>
+            <a:ext cx="6096000" cy="369332"/>
+          </a:xfrm>
+          <a:prstGeom prst="rect">
+            <a:avLst/>
+          </a:prstGeom>
+          <a:noFill/>
+        </p:spPr>
+        <p:txBody>
+          <a:bodyPr wrap="square">
+            <a:spAutoFit/>
+          </a:bodyPr>
+          <a:lstStyle/>
+          <a:p>
+            <a:r>
+              <a:rPr lang="en-US" sz="1800" b="1" i="0" u="none" strike="noStrike" baseline="0" dirty="0">
+                <a:latin typeface="LiberationSans-Bold"/>
+              </a:rPr>
+              <a:t>COMMANDS VERSUS REQUESTS</a:t>
+            </a:r>
+            <a:endParaRPr lang="en-US" dirty="0"/>
+          </a:p>
+        </p:txBody>
+      </p:sp>
+      <p:sp>
+        <p:nvSpPr>
+          <p:cNvPr id="15" name="TextBox 14">
+            <a:extLst>
+              <a:ext uri="{FF2B5EF4-FFF2-40B4-BE49-F238E27FC236}">
+                <a16:creationId xmlns:a16="http://schemas.microsoft.com/office/drawing/2014/main" id="{768F18B5-D0C1-71ED-4395-CF350B4E308F}"/>
+              </a:ext>
+            </a:extLst>
+          </p:cNvPr>
+          <p:cNvSpPr txBox="1"/>
+          <p:nvPr/>
+        </p:nvSpPr>
+        <p:spPr>
+          <a:xfrm>
+            <a:off x="433136" y="3325805"/>
+            <a:ext cx="6096000" cy="646331"/>
+          </a:xfrm>
+          <a:prstGeom prst="rect">
+            <a:avLst/>
+          </a:prstGeom>
+          <a:noFill/>
+        </p:spPr>
+        <p:txBody>
+          <a:bodyPr wrap="square">
+            <a:spAutoFit/>
+          </a:bodyPr>
+          <a:lstStyle/>
+          <a:p>
+            <a:pPr algn="l"/>
+            <a:r>
+              <a:rPr lang="en-US" sz="1800" b="0" i="0" u="none" strike="noStrike" baseline="0" dirty="0">
+                <a:latin typeface="LiberationSerif"/>
+              </a:rPr>
+              <a:t>just remember that a microservice gets to reject the request/command if appropriate.</a:t>
+            </a:r>
+            <a:endParaRPr lang="en-US" dirty="0"/>
+          </a:p>
+        </p:txBody>
+      </p:sp>
+      <p:sp>
+        <p:nvSpPr>
+          <p:cNvPr id="17" name="TextBox 16">
+            <a:extLst>
+              <a:ext uri="{FF2B5EF4-FFF2-40B4-BE49-F238E27FC236}">
+                <a16:creationId xmlns:a16="http://schemas.microsoft.com/office/drawing/2014/main" id="{F003B28F-CC6B-54AA-7F17-432FD3603CB3}"/>
+              </a:ext>
+            </a:extLst>
+          </p:cNvPr>
+          <p:cNvSpPr txBox="1"/>
+          <p:nvPr/>
+        </p:nvSpPr>
+        <p:spPr>
+          <a:xfrm>
+            <a:off x="433136" y="4151144"/>
+            <a:ext cx="6096000" cy="369332"/>
+          </a:xfrm>
+          <a:prstGeom prst="rect">
+            <a:avLst/>
+          </a:prstGeom>
+          <a:noFill/>
+        </p:spPr>
+        <p:txBody>
+          <a:bodyPr wrap="square">
+            <a:spAutoFit/>
+          </a:bodyPr>
+          <a:lstStyle/>
+          <a:p>
+            <a:r>
+              <a:rPr lang="en-US" sz="1800" b="1" i="0" u="none" strike="noStrike" baseline="0" dirty="0">
+                <a:latin typeface="LiberationSans-Bold"/>
+              </a:rPr>
+              <a:t>Implementation: Synchronous Versus Asynchronous</a:t>
+            </a:r>
+            <a:endParaRPr lang="en-US" dirty="0"/>
+          </a:p>
+        </p:txBody>
+      </p:sp>
+      <p:pic>
+        <p:nvPicPr>
+          <p:cNvPr id="19" name="Picture 18">
+            <a:extLst>
+              <a:ext uri="{FF2B5EF4-FFF2-40B4-BE49-F238E27FC236}">
+                <a16:creationId xmlns:a16="http://schemas.microsoft.com/office/drawing/2014/main" id="{F3315114-AB6F-C763-86FE-1E98ADCEF7E5}"/>
+              </a:ext>
+            </a:extLst>
+          </p:cNvPr>
+          <p:cNvPicPr>
+            <a:picLocks noChangeAspect="1"/>
+          </p:cNvPicPr>
+          <p:nvPr/>
+        </p:nvPicPr>
+        <p:blipFill>
+          <a:blip r:embed="rId2"/>
+          <a:stretch>
+            <a:fillRect/>
+          </a:stretch>
+        </p:blipFill>
+        <p:spPr>
+          <a:xfrm>
+            <a:off x="6859242" y="1014212"/>
+            <a:ext cx="3863661" cy="2414788"/>
+          </a:xfrm>
+          <a:prstGeom prst="rect">
+            <a:avLst/>
+          </a:prstGeom>
+        </p:spPr>
+      </p:pic>
+      <p:pic>
+        <p:nvPicPr>
+          <p:cNvPr id="21" name="Picture 20">
+            <a:extLst>
+              <a:ext uri="{FF2B5EF4-FFF2-40B4-BE49-F238E27FC236}">
+                <a16:creationId xmlns:a16="http://schemas.microsoft.com/office/drawing/2014/main" id="{D42AFB3D-8487-CBF1-21D1-F1818C3177BC}"/>
+              </a:ext>
+            </a:extLst>
+          </p:cNvPr>
+          <p:cNvPicPr>
+            <a:picLocks noChangeAspect="1"/>
+          </p:cNvPicPr>
+          <p:nvPr/>
+        </p:nvPicPr>
+        <p:blipFill>
+          <a:blip r:embed="rId3"/>
+          <a:stretch>
+            <a:fillRect/>
+          </a:stretch>
+        </p:blipFill>
+        <p:spPr>
+          <a:xfrm>
+            <a:off x="6739107" y="3972136"/>
+            <a:ext cx="4103929" cy="2708593"/>
+          </a:xfrm>
+          <a:prstGeom prst="rect">
+            <a:avLst/>
+          </a:prstGeom>
+        </p:spPr>
+      </p:pic>
+      <p:sp>
+        <p:nvSpPr>
+          <p:cNvPr id="23" name="TextBox 22">
+            <a:extLst>
+              <a:ext uri="{FF2B5EF4-FFF2-40B4-BE49-F238E27FC236}">
+                <a16:creationId xmlns:a16="http://schemas.microsoft.com/office/drawing/2014/main" id="{DBFE29E0-43F6-E28B-0093-17B4E4320406}"/>
+              </a:ext>
+            </a:extLst>
+          </p:cNvPr>
+          <p:cNvSpPr txBox="1"/>
+          <p:nvPr/>
+        </p:nvSpPr>
+        <p:spPr>
+          <a:xfrm>
+            <a:off x="433136" y="4699484"/>
+            <a:ext cx="6096000" cy="1200329"/>
+          </a:xfrm>
+          <a:prstGeom prst="rect">
+            <a:avLst/>
+          </a:prstGeom>
+          <a:noFill/>
+        </p:spPr>
+        <p:txBody>
+          <a:bodyPr wrap="square">
+            <a:spAutoFit/>
+          </a:bodyPr>
+          <a:lstStyle/>
+          <a:p>
+            <a:pPr algn="l"/>
+            <a:r>
+              <a:rPr lang="en-US" sz="1800" b="0" i="0" u="none" strike="noStrike" baseline="0" dirty="0">
+                <a:latin typeface="LiberationSerif"/>
+              </a:rPr>
+              <a:t>When using a queue, we have the added benefit that multiple requests could be buffered up in the queue waiting to be handled. This can help in situations in which the requests can’t be handled quickly enough.</a:t>
+            </a:r>
+            <a:endParaRPr lang="en-US" dirty="0"/>
+          </a:p>
+        </p:txBody>
+      </p:sp>
+    </p:spTree>
+    <p:extLst>
+      <p:ext uri="{BB962C8B-B14F-4D97-AF65-F5344CB8AC3E}">
+        <p14:creationId xmlns:p14="http://schemas.microsoft.com/office/powerpoint/2010/main" val="81994499"/>
+      </p:ext>
+    </p:extLst>
+  </p:cSld>
+  <p:clrMapOvr>
+    <a:masterClrMapping/>
+  </p:clrMapOvr>
+</p:sld>
+</file>
+
+<file path=ppt/slides/slide15.xml><?xml version="1.0" encoding="utf-8"?>
+<p:sld xmlns:a="http://schemas.openxmlformats.org/drawingml/2006/main" xmlns:r="http://schemas.openxmlformats.org/officeDocument/2006/relationships" xmlns:p="http://schemas.openxmlformats.org/presentationml/2006/main">
+  <p:cSld>
+    <p:spTree>
+      <p:nvGrpSpPr>
+        <p:cNvPr id="1" name=""/>
+        <p:cNvGrpSpPr/>
+        <p:nvPr/>
+      </p:nvGrpSpPr>
+      <p:grpSpPr>
+        <a:xfrm>
+          <a:off x="0" y="0"/>
+          <a:ext cx="0" cy="0"/>
+          <a:chOff x="0" y="0"/>
+          <a:chExt cx="0" cy="0"/>
+        </a:xfrm>
+      </p:grpSpPr>
+      <p:sp>
+        <p:nvSpPr>
+          <p:cNvPr id="4" name="TextBox 3">
+            <a:extLst>
+              <a:ext uri="{FF2B5EF4-FFF2-40B4-BE49-F238E27FC236}">
+                <a16:creationId xmlns:a16="http://schemas.microsoft.com/office/drawing/2014/main" id="{468D1756-E8A5-A0FD-E8E1-BAB510D21D8B}"/>
+              </a:ext>
+            </a:extLst>
+          </p:cNvPr>
+          <p:cNvSpPr txBox="1"/>
+          <p:nvPr/>
+        </p:nvSpPr>
+        <p:spPr>
+          <a:xfrm>
+            <a:off x="433136" y="376807"/>
+            <a:ext cx="6096000" cy="369332"/>
+          </a:xfrm>
+          <a:prstGeom prst="rect">
+            <a:avLst/>
+          </a:prstGeom>
+          <a:noFill/>
+        </p:spPr>
+        <p:txBody>
+          <a:bodyPr wrap="square">
+            <a:spAutoFit/>
+          </a:bodyPr>
+          <a:lstStyle/>
+          <a:p>
+            <a:r>
+              <a:rPr lang="en-US" sz="1800" b="1" i="0" u="none" strike="noStrike" baseline="0" dirty="0">
+                <a:solidFill>
+                  <a:srgbClr val="8F0012"/>
+                </a:solidFill>
+                <a:latin typeface="LiberationSans-Bold"/>
+              </a:rPr>
+              <a:t>Pattern: Request-Response Communication</a:t>
+            </a:r>
+            <a:endParaRPr lang="en-US" dirty="0"/>
+          </a:p>
+        </p:txBody>
+      </p:sp>
+      <p:sp>
+        <p:nvSpPr>
+          <p:cNvPr id="6" name="TextBox 5">
+            <a:extLst>
+              <a:ext uri="{FF2B5EF4-FFF2-40B4-BE49-F238E27FC236}">
+                <a16:creationId xmlns:a16="http://schemas.microsoft.com/office/drawing/2014/main" id="{BBB05680-6CFB-72C2-7C89-3EA682F80361}"/>
+              </a:ext>
+            </a:extLst>
+          </p:cNvPr>
+          <p:cNvSpPr txBox="1"/>
+          <p:nvPr/>
+        </p:nvSpPr>
+        <p:spPr>
+          <a:xfrm>
+            <a:off x="433136" y="746139"/>
+            <a:ext cx="6096000" cy="369332"/>
+          </a:xfrm>
+          <a:prstGeom prst="rect">
+            <a:avLst/>
+          </a:prstGeom>
+          <a:noFill/>
+        </p:spPr>
+        <p:txBody>
+          <a:bodyPr wrap="square">
+            <a:spAutoFit/>
+          </a:bodyPr>
+          <a:lstStyle/>
+          <a:p>
+            <a:r>
+              <a:rPr lang="en-US" sz="1800" b="1" i="0" u="none" strike="noStrike" baseline="0" dirty="0">
+                <a:latin typeface="LiberationSans-Bold"/>
+              </a:rPr>
+              <a:t>PARALLEL VERSUS SEQUENTIAL CALLS</a:t>
+            </a:r>
+            <a:endParaRPr lang="en-US" dirty="0"/>
+          </a:p>
+        </p:txBody>
+      </p:sp>
+      <p:sp>
+        <p:nvSpPr>
+          <p:cNvPr id="8" name="TextBox 7">
+            <a:extLst>
+              <a:ext uri="{FF2B5EF4-FFF2-40B4-BE49-F238E27FC236}">
+                <a16:creationId xmlns:a16="http://schemas.microsoft.com/office/drawing/2014/main" id="{C4DD985F-5BF6-FFF4-6F9A-97946D2DB2D0}"/>
+              </a:ext>
+            </a:extLst>
+          </p:cNvPr>
+          <p:cNvSpPr txBox="1"/>
+          <p:nvPr/>
+        </p:nvSpPr>
+        <p:spPr>
+          <a:xfrm>
+            <a:off x="433136" y="1115471"/>
+            <a:ext cx="6096000" cy="646331"/>
+          </a:xfrm>
+          <a:prstGeom prst="rect">
+            <a:avLst/>
+          </a:prstGeom>
+          <a:noFill/>
+        </p:spPr>
+        <p:txBody>
+          <a:bodyPr wrap="square">
+            <a:spAutoFit/>
+          </a:bodyPr>
+          <a:lstStyle/>
+          <a:p>
+            <a:pPr algn="l"/>
+            <a:r>
+              <a:rPr lang="en-US" sz="1800" b="0" i="0" u="none" strike="noStrike" baseline="0" dirty="0">
+                <a:latin typeface="LiberationSerif"/>
+              </a:rPr>
+              <a:t>you will need to make multiple calls before you can continue with some processing</a:t>
+            </a:r>
+            <a:endParaRPr lang="en-US" dirty="0"/>
+          </a:p>
+        </p:txBody>
+      </p:sp>
+      <p:sp>
+        <p:nvSpPr>
+          <p:cNvPr id="10" name="TextBox 9">
+            <a:extLst>
+              <a:ext uri="{FF2B5EF4-FFF2-40B4-BE49-F238E27FC236}">
+                <a16:creationId xmlns:a16="http://schemas.microsoft.com/office/drawing/2014/main" id="{40A78425-A73F-6C47-2132-AFB9536B984B}"/>
+              </a:ext>
+            </a:extLst>
+          </p:cNvPr>
+          <p:cNvSpPr txBox="1"/>
+          <p:nvPr/>
+        </p:nvSpPr>
+        <p:spPr>
+          <a:xfrm>
+            <a:off x="433136" y="1854135"/>
+            <a:ext cx="6096000" cy="646331"/>
+          </a:xfrm>
+          <a:prstGeom prst="rect">
+            <a:avLst/>
+          </a:prstGeom>
+          <a:noFill/>
+        </p:spPr>
+        <p:txBody>
+          <a:bodyPr wrap="square">
+            <a:spAutoFit/>
+          </a:bodyPr>
+          <a:lstStyle/>
+          <a:p>
+            <a:pPr algn="l"/>
+            <a:r>
+              <a:rPr lang="en-US" sz="1800" b="0" i="0" u="none" strike="noStrike" baseline="0" dirty="0">
+                <a:latin typeface="LiberationSerif"/>
+              </a:rPr>
+              <a:t>We could decide to make the three calls in sequence— (waiting for each one to finish before proceeding)</a:t>
+            </a:r>
+            <a:endParaRPr lang="en-US" dirty="0"/>
+          </a:p>
+        </p:txBody>
+      </p:sp>
+      <p:sp>
+        <p:nvSpPr>
+          <p:cNvPr id="12" name="TextBox 11">
+            <a:extLst>
+              <a:ext uri="{FF2B5EF4-FFF2-40B4-BE49-F238E27FC236}">
+                <a16:creationId xmlns:a16="http://schemas.microsoft.com/office/drawing/2014/main" id="{820FAFDF-E182-8A1F-A9D3-F58F3FC70496}"/>
+              </a:ext>
+            </a:extLst>
+          </p:cNvPr>
+          <p:cNvSpPr txBox="1"/>
+          <p:nvPr/>
+        </p:nvSpPr>
+        <p:spPr>
+          <a:xfrm>
+            <a:off x="433136" y="2592799"/>
+            <a:ext cx="6096000" cy="369332"/>
+          </a:xfrm>
+          <a:prstGeom prst="rect">
+            <a:avLst/>
+          </a:prstGeom>
+          <a:noFill/>
+        </p:spPr>
+        <p:txBody>
+          <a:bodyPr wrap="square">
+            <a:spAutoFit/>
+          </a:bodyPr>
+          <a:lstStyle/>
+          <a:p>
+            <a:pPr algn="l"/>
+            <a:r>
+              <a:rPr lang="en-US" sz="1800" b="0" i="0" u="none" strike="noStrike" baseline="0" dirty="0">
+                <a:latin typeface="LiberationSerif"/>
+              </a:rPr>
+              <a:t>waiting for the sum of latencies of each of the calls</a:t>
+            </a:r>
+            <a:endParaRPr lang="en-US" dirty="0"/>
+          </a:p>
+        </p:txBody>
+      </p:sp>
+      <p:sp>
+        <p:nvSpPr>
+          <p:cNvPr id="14" name="TextBox 13">
+            <a:extLst>
+              <a:ext uri="{FF2B5EF4-FFF2-40B4-BE49-F238E27FC236}">
+                <a16:creationId xmlns:a16="http://schemas.microsoft.com/office/drawing/2014/main" id="{2DEC205A-342A-5B58-5305-659FC6533046}"/>
+              </a:ext>
+            </a:extLst>
+          </p:cNvPr>
+          <p:cNvSpPr txBox="1"/>
+          <p:nvPr/>
+        </p:nvSpPr>
+        <p:spPr>
+          <a:xfrm>
+            <a:off x="433136" y="3100630"/>
+            <a:ext cx="6096000" cy="369332"/>
+          </a:xfrm>
+          <a:prstGeom prst="rect">
+            <a:avLst/>
+          </a:prstGeom>
+          <a:noFill/>
+        </p:spPr>
+        <p:txBody>
+          <a:bodyPr wrap="square">
+            <a:spAutoFit/>
+          </a:bodyPr>
+          <a:lstStyle/>
+          <a:p>
+            <a:r>
+              <a:rPr lang="en-US" sz="1800" b="0" i="0" u="none" strike="noStrike" baseline="0" dirty="0">
+                <a:latin typeface="LiberationSerif"/>
+              </a:rPr>
+              <a:t>run these three requests in parallel</a:t>
+            </a:r>
+            <a:endParaRPr lang="en-US" dirty="0"/>
+          </a:p>
+        </p:txBody>
+      </p:sp>
+      <p:sp>
+        <p:nvSpPr>
+          <p:cNvPr id="16" name="TextBox 15">
+            <a:extLst>
+              <a:ext uri="{FF2B5EF4-FFF2-40B4-BE49-F238E27FC236}">
+                <a16:creationId xmlns:a16="http://schemas.microsoft.com/office/drawing/2014/main" id="{0F54FAAF-CAE0-EFE2-1798-AF6A599ACD68}"/>
+              </a:ext>
+            </a:extLst>
+          </p:cNvPr>
+          <p:cNvSpPr txBox="1"/>
+          <p:nvPr/>
+        </p:nvSpPr>
+        <p:spPr>
+          <a:xfrm>
+            <a:off x="433136" y="3538199"/>
+            <a:ext cx="6096000" cy="646331"/>
+          </a:xfrm>
+          <a:prstGeom prst="rect">
+            <a:avLst/>
+          </a:prstGeom>
+          <a:noFill/>
+        </p:spPr>
+        <p:txBody>
+          <a:bodyPr wrap="square">
+            <a:spAutoFit/>
+          </a:bodyPr>
+          <a:lstStyle/>
+          <a:p>
+            <a:r>
+              <a:rPr lang="en-US" sz="1800" b="0" i="0" u="none" strike="noStrike" baseline="0" dirty="0">
+                <a:latin typeface="LiberationSerif"/>
+              </a:rPr>
+              <a:t>overall latency of the operation would be based on the slowest API call</a:t>
+            </a:r>
+            <a:endParaRPr lang="en-US" dirty="0"/>
+          </a:p>
+        </p:txBody>
+      </p:sp>
+      <p:sp>
+        <p:nvSpPr>
+          <p:cNvPr id="18" name="TextBox 17">
+            <a:extLst>
+              <a:ext uri="{FF2B5EF4-FFF2-40B4-BE49-F238E27FC236}">
+                <a16:creationId xmlns:a16="http://schemas.microsoft.com/office/drawing/2014/main" id="{B53EA424-5D2A-E4AE-192D-C9A4EBD70B57}"/>
+              </a:ext>
+            </a:extLst>
+          </p:cNvPr>
+          <p:cNvSpPr txBox="1"/>
+          <p:nvPr/>
+        </p:nvSpPr>
+        <p:spPr>
+          <a:xfrm>
+            <a:off x="433136" y="4184530"/>
+            <a:ext cx="6096000" cy="646331"/>
+          </a:xfrm>
+          <a:prstGeom prst="rect">
+            <a:avLst/>
+          </a:prstGeom>
+          <a:noFill/>
+        </p:spPr>
+        <p:txBody>
+          <a:bodyPr wrap="square">
+            <a:spAutoFit/>
+          </a:bodyPr>
+          <a:lstStyle/>
+          <a:p>
+            <a:pPr algn="l"/>
+            <a:r>
+              <a:rPr lang="en-US" sz="1800" b="0" i="0" u="none" strike="noStrike" baseline="0" dirty="0">
+                <a:latin typeface="LiberationSerif"/>
+              </a:rPr>
+              <a:t>can result in significant improvements in the latency of some operations</a:t>
+            </a:r>
+            <a:endParaRPr lang="en-US" dirty="0"/>
+          </a:p>
+        </p:txBody>
+      </p:sp>
+      <p:sp>
+        <p:nvSpPr>
+          <p:cNvPr id="20" name="TextBox 19">
+            <a:extLst>
+              <a:ext uri="{FF2B5EF4-FFF2-40B4-BE49-F238E27FC236}">
+                <a16:creationId xmlns:a16="http://schemas.microsoft.com/office/drawing/2014/main" id="{2AAB9E64-F3B0-7E9F-A08F-43CF8FC38997}"/>
+              </a:ext>
+            </a:extLst>
+          </p:cNvPr>
+          <p:cNvSpPr txBox="1"/>
+          <p:nvPr/>
+        </p:nvSpPr>
+        <p:spPr>
+          <a:xfrm>
+            <a:off x="433136" y="4875652"/>
+            <a:ext cx="6096000" cy="369332"/>
+          </a:xfrm>
+          <a:prstGeom prst="rect">
+            <a:avLst/>
+          </a:prstGeom>
+          <a:noFill/>
+        </p:spPr>
+        <p:txBody>
+          <a:bodyPr wrap="square">
+            <a:spAutoFit/>
+          </a:bodyPr>
+          <a:lstStyle/>
+          <a:p>
+            <a:r>
+              <a:rPr lang="en-US" sz="1800" b="1" i="0" u="none" strike="noStrike" baseline="0" dirty="0">
+                <a:latin typeface="LiberationSans-Bold"/>
+              </a:rPr>
+              <a:t>Where to Use It</a:t>
+            </a:r>
+            <a:endParaRPr lang="en-US" dirty="0"/>
+          </a:p>
+        </p:txBody>
+      </p:sp>
+      <p:sp>
+        <p:nvSpPr>
+          <p:cNvPr id="22" name="TextBox 21">
+            <a:extLst>
+              <a:ext uri="{FF2B5EF4-FFF2-40B4-BE49-F238E27FC236}">
+                <a16:creationId xmlns:a16="http://schemas.microsoft.com/office/drawing/2014/main" id="{640E0AA4-BD09-28D0-7AAA-DA609BE857F5}"/>
+              </a:ext>
+            </a:extLst>
+          </p:cNvPr>
+          <p:cNvSpPr txBox="1"/>
+          <p:nvPr/>
+        </p:nvSpPr>
+        <p:spPr>
+          <a:xfrm>
+            <a:off x="433136" y="5244984"/>
+            <a:ext cx="6096000" cy="646331"/>
+          </a:xfrm>
+          <a:prstGeom prst="rect">
+            <a:avLst/>
+          </a:prstGeom>
+          <a:noFill/>
+        </p:spPr>
+        <p:txBody>
+          <a:bodyPr wrap="square">
+            <a:spAutoFit/>
+          </a:bodyPr>
+          <a:lstStyle/>
+          <a:p>
+            <a:pPr algn="l"/>
+            <a:r>
+              <a:rPr lang="en-US" sz="1800" b="0" i="0" u="none" strike="noStrike" baseline="0" dirty="0">
+                <a:latin typeface="LiberationSerif"/>
+              </a:rPr>
+              <a:t>the result of a request is needed before further processing can take place</a:t>
+            </a:r>
+            <a:endParaRPr lang="en-US" dirty="0"/>
+          </a:p>
+        </p:txBody>
+      </p:sp>
+      <p:sp>
+        <p:nvSpPr>
+          <p:cNvPr id="24" name="TextBox 23">
+            <a:extLst>
+              <a:ext uri="{FF2B5EF4-FFF2-40B4-BE49-F238E27FC236}">
+                <a16:creationId xmlns:a16="http://schemas.microsoft.com/office/drawing/2014/main" id="{8E264139-1126-2DEC-7489-84A8C2EF90AE}"/>
+              </a:ext>
+            </a:extLst>
+          </p:cNvPr>
+          <p:cNvSpPr txBox="1"/>
+          <p:nvPr/>
+        </p:nvSpPr>
+        <p:spPr>
+          <a:xfrm>
+            <a:off x="433136" y="5891315"/>
+            <a:ext cx="6096000" cy="923330"/>
+          </a:xfrm>
+          <a:prstGeom prst="rect">
+            <a:avLst/>
+          </a:prstGeom>
+          <a:noFill/>
+        </p:spPr>
+        <p:txBody>
+          <a:bodyPr wrap="square">
+            <a:spAutoFit/>
+          </a:bodyPr>
+          <a:lstStyle/>
+          <a:p>
+            <a:pPr algn="l"/>
+            <a:r>
+              <a:rPr lang="en-US" sz="1800" b="0" i="0" u="none" strike="noStrike" baseline="0" dirty="0">
+                <a:latin typeface="LiberationSerif"/>
+              </a:rPr>
+              <a:t>microservice wants to know if a call didn’t work</a:t>
+            </a:r>
+          </a:p>
+          <a:p>
+            <a:pPr algn="l"/>
+            <a:r>
+              <a:rPr lang="en-US" sz="1800" b="0" i="0" u="none" strike="noStrike" baseline="0" dirty="0">
+                <a:latin typeface="LiberationSerif"/>
+              </a:rPr>
+              <a:t>so that it can carry out some sort of compensating action, like a retry</a:t>
+            </a:r>
+            <a:endParaRPr lang="en-US" dirty="0"/>
+          </a:p>
+        </p:txBody>
+      </p:sp>
+    </p:spTree>
+    <p:extLst>
+      <p:ext uri="{BB962C8B-B14F-4D97-AF65-F5344CB8AC3E}">
+        <p14:creationId xmlns:p14="http://schemas.microsoft.com/office/powerpoint/2010/main" val="859393348"/>
+      </p:ext>
+    </p:extLst>
+  </p:cSld>
+  <p:clrMapOvr>
+    <a:masterClrMapping/>
+  </p:clrMapOvr>
+</p:sld>
+</file>
+
+<file path=ppt/slides/slide16.xml><?xml version="1.0" encoding="utf-8"?>
+<p:sld xmlns:a="http://schemas.openxmlformats.org/drawingml/2006/main" xmlns:r="http://schemas.openxmlformats.org/officeDocument/2006/relationships" xmlns:p="http://schemas.openxmlformats.org/presentationml/2006/main">
+  <p:cSld>
+    <p:spTree>
+      <p:nvGrpSpPr>
+        <p:cNvPr id="1" name=""/>
+        <p:cNvGrpSpPr/>
+        <p:nvPr/>
+      </p:nvGrpSpPr>
+      <p:grpSpPr>
+        <a:xfrm>
+          <a:off x="0" y="0"/>
+          <a:ext cx="0" cy="0"/>
+          <a:chOff x="0" y="0"/>
+          <a:chExt cx="0" cy="0"/>
+        </a:xfrm>
+      </p:grpSpPr>
+      <p:sp>
+        <p:nvSpPr>
+          <p:cNvPr id="5" name="TextBox 4">
+            <a:extLst>
+              <a:ext uri="{FF2B5EF4-FFF2-40B4-BE49-F238E27FC236}">
+                <a16:creationId xmlns:a16="http://schemas.microsoft.com/office/drawing/2014/main" id="{6F2EAFDE-BAB2-6FB0-6115-A59EC36D5FB4}"/>
+              </a:ext>
+            </a:extLst>
+          </p:cNvPr>
+          <p:cNvSpPr txBox="1"/>
+          <p:nvPr/>
+        </p:nvSpPr>
+        <p:spPr>
+          <a:xfrm>
+            <a:off x="208547" y="216386"/>
+            <a:ext cx="6096000" cy="369332"/>
+          </a:xfrm>
+          <a:prstGeom prst="rect">
+            <a:avLst/>
+          </a:prstGeom>
+          <a:noFill/>
+        </p:spPr>
+        <p:txBody>
+          <a:bodyPr wrap="square">
+            <a:spAutoFit/>
+          </a:bodyPr>
+          <a:lstStyle/>
+          <a:p>
+            <a:r>
+              <a:rPr lang="en-US" sz="1800" b="1" i="0" u="none" strike="noStrike" baseline="0" dirty="0">
+                <a:solidFill>
+                  <a:srgbClr val="8F0012"/>
+                </a:solidFill>
+                <a:latin typeface="LiberationSans-Bold"/>
+              </a:rPr>
+              <a:t>Pattern: Event-Driven Communication</a:t>
+            </a:r>
+            <a:endParaRPr lang="en-US" dirty="0"/>
+          </a:p>
+        </p:txBody>
+      </p:sp>
+      <p:sp>
+        <p:nvSpPr>
+          <p:cNvPr id="7" name="TextBox 6">
+            <a:extLst>
+              <a:ext uri="{FF2B5EF4-FFF2-40B4-BE49-F238E27FC236}">
+                <a16:creationId xmlns:a16="http://schemas.microsoft.com/office/drawing/2014/main" id="{FE96A39E-6231-B3CB-415D-40452D8E6FC5}"/>
+              </a:ext>
+            </a:extLst>
+          </p:cNvPr>
+          <p:cNvSpPr txBox="1"/>
+          <p:nvPr/>
+        </p:nvSpPr>
+        <p:spPr>
+          <a:xfrm>
+            <a:off x="208547" y="585718"/>
+            <a:ext cx="6096000" cy="646331"/>
+          </a:xfrm>
+          <a:prstGeom prst="rect">
+            <a:avLst/>
+          </a:prstGeom>
+          <a:noFill/>
+        </p:spPr>
+        <p:txBody>
+          <a:bodyPr wrap="square">
+            <a:spAutoFit/>
+          </a:bodyPr>
+          <a:lstStyle/>
+          <a:p>
+            <a:pPr algn="l"/>
+            <a:r>
+              <a:rPr lang="en-US" sz="1800" b="0" i="0" u="none" strike="noStrike" baseline="0" dirty="0">
+                <a:latin typeface="LiberationSerif"/>
+              </a:rPr>
+              <a:t>a microservice emits events that may or may not be received by other microservices</a:t>
+            </a:r>
+            <a:endParaRPr lang="en-US" dirty="0"/>
+          </a:p>
+        </p:txBody>
+      </p:sp>
+      <p:sp>
+        <p:nvSpPr>
+          <p:cNvPr id="9" name="TextBox 8">
+            <a:extLst>
+              <a:ext uri="{FF2B5EF4-FFF2-40B4-BE49-F238E27FC236}">
+                <a16:creationId xmlns:a16="http://schemas.microsoft.com/office/drawing/2014/main" id="{0DE206D5-9566-7459-3681-1FF400C1826D}"/>
+              </a:ext>
+            </a:extLst>
+          </p:cNvPr>
+          <p:cNvSpPr txBox="1"/>
+          <p:nvPr/>
+        </p:nvSpPr>
+        <p:spPr>
+          <a:xfrm>
+            <a:off x="208547" y="1232049"/>
+            <a:ext cx="6096000" cy="923330"/>
+          </a:xfrm>
+          <a:prstGeom prst="rect">
+            <a:avLst/>
+          </a:prstGeom>
+          <a:noFill/>
+        </p:spPr>
+        <p:txBody>
+          <a:bodyPr wrap="square">
+            <a:spAutoFit/>
+          </a:bodyPr>
+          <a:lstStyle/>
+          <a:p>
+            <a:r>
+              <a:rPr lang="en-US" sz="1800" b="0" i="0" u="none" strike="noStrike" baseline="0" dirty="0">
+                <a:latin typeface="LiberationSerif"/>
+              </a:rPr>
+              <a:t>An </a:t>
+            </a:r>
+            <a:r>
+              <a:rPr lang="en-US" sz="1800" b="0" i="1" u="none" strike="noStrike" baseline="0" dirty="0">
+                <a:latin typeface="LiberationSerif"/>
+              </a:rPr>
+              <a:t>event</a:t>
+            </a:r>
+            <a:r>
+              <a:rPr lang="en-US" sz="1800" b="0" i="0" u="none" strike="noStrike" baseline="0" dirty="0">
+                <a:latin typeface="LiberationSerif"/>
+              </a:rPr>
+              <a:t> is a statement about something that has occurred (nearly always inside the world of microservice emitting the event)</a:t>
+            </a:r>
+            <a:endParaRPr lang="en-US" dirty="0"/>
+          </a:p>
+        </p:txBody>
+      </p:sp>
+      <p:sp>
+        <p:nvSpPr>
+          <p:cNvPr id="11" name="TextBox 10">
+            <a:extLst>
+              <a:ext uri="{FF2B5EF4-FFF2-40B4-BE49-F238E27FC236}">
+                <a16:creationId xmlns:a16="http://schemas.microsoft.com/office/drawing/2014/main" id="{A3C19D86-7703-88BE-08E9-A3D27ED61A54}"/>
+              </a:ext>
+            </a:extLst>
+          </p:cNvPr>
+          <p:cNvSpPr txBox="1"/>
+          <p:nvPr/>
+        </p:nvSpPr>
+        <p:spPr>
+          <a:xfrm>
+            <a:off x="208547" y="2155379"/>
+            <a:ext cx="6096000" cy="646331"/>
+          </a:xfrm>
+          <a:prstGeom prst="rect">
+            <a:avLst/>
+          </a:prstGeom>
+          <a:noFill/>
+        </p:spPr>
+        <p:txBody>
+          <a:bodyPr wrap="square">
+            <a:spAutoFit/>
+          </a:bodyPr>
+          <a:lstStyle/>
+          <a:p>
+            <a:pPr algn="l"/>
+            <a:r>
+              <a:rPr lang="en-US" sz="1800" b="0" i="0" u="none" strike="noStrike" baseline="0" dirty="0">
+                <a:latin typeface="LiberationSerif"/>
+              </a:rPr>
+              <a:t>has no knowledge of the intent of other microservices to use the event</a:t>
+            </a:r>
+            <a:endParaRPr lang="en-US" dirty="0"/>
+          </a:p>
+        </p:txBody>
+      </p:sp>
+      <p:pic>
+        <p:nvPicPr>
+          <p:cNvPr id="13" name="Picture 12">
+            <a:extLst>
+              <a:ext uri="{FF2B5EF4-FFF2-40B4-BE49-F238E27FC236}">
+                <a16:creationId xmlns:a16="http://schemas.microsoft.com/office/drawing/2014/main" id="{A29E14C6-A8E5-C20D-B8D8-D17DF03F7611}"/>
+              </a:ext>
+            </a:extLst>
+          </p:cNvPr>
+          <p:cNvPicPr>
+            <a:picLocks noChangeAspect="1"/>
+          </p:cNvPicPr>
+          <p:nvPr/>
+        </p:nvPicPr>
+        <p:blipFill>
+          <a:blip r:embed="rId2"/>
+          <a:stretch>
+            <a:fillRect/>
+          </a:stretch>
+        </p:blipFill>
+        <p:spPr>
+          <a:xfrm>
+            <a:off x="6304546" y="496515"/>
+            <a:ext cx="4255745" cy="2305195"/>
+          </a:xfrm>
+          <a:prstGeom prst="rect">
+            <a:avLst/>
+          </a:prstGeom>
+        </p:spPr>
+      </p:pic>
+      <p:sp>
+        <p:nvSpPr>
+          <p:cNvPr id="15" name="TextBox 14">
+            <a:extLst>
+              <a:ext uri="{FF2B5EF4-FFF2-40B4-BE49-F238E27FC236}">
+                <a16:creationId xmlns:a16="http://schemas.microsoft.com/office/drawing/2014/main" id="{C8580157-69B6-3B4D-8616-116AD3A95685}"/>
+              </a:ext>
+            </a:extLst>
+          </p:cNvPr>
+          <p:cNvSpPr txBox="1"/>
+          <p:nvPr/>
+        </p:nvSpPr>
+        <p:spPr>
+          <a:xfrm>
+            <a:off x="208547" y="2890913"/>
+            <a:ext cx="6096000" cy="646331"/>
+          </a:xfrm>
+          <a:prstGeom prst="rect">
+            <a:avLst/>
+          </a:prstGeom>
+          <a:noFill/>
+        </p:spPr>
+        <p:txBody>
+          <a:bodyPr wrap="square">
+            <a:spAutoFit/>
+          </a:bodyPr>
+          <a:lstStyle/>
+          <a:p>
+            <a:r>
+              <a:rPr lang="en-US" sz="1800" b="0" i="0" u="none" strike="noStrike" baseline="0" dirty="0">
+                <a:latin typeface="LiberationSerif"/>
+              </a:rPr>
+              <a:t>event-driven interactions much more loosely coupled in general</a:t>
+            </a:r>
+            <a:endParaRPr lang="en-US" dirty="0"/>
+          </a:p>
+        </p:txBody>
+      </p:sp>
+      <p:sp>
+        <p:nvSpPr>
+          <p:cNvPr id="17" name="TextBox 16">
+            <a:extLst>
+              <a:ext uri="{FF2B5EF4-FFF2-40B4-BE49-F238E27FC236}">
+                <a16:creationId xmlns:a16="http://schemas.microsoft.com/office/drawing/2014/main" id="{B411AB68-CBEC-E9E4-3173-E5416C586434}"/>
+              </a:ext>
+            </a:extLst>
+          </p:cNvPr>
+          <p:cNvSpPr txBox="1"/>
+          <p:nvPr/>
+        </p:nvSpPr>
+        <p:spPr>
+          <a:xfrm>
+            <a:off x="208547" y="3626447"/>
+            <a:ext cx="6096000" cy="646331"/>
+          </a:xfrm>
+          <a:prstGeom prst="rect">
+            <a:avLst/>
+          </a:prstGeom>
+          <a:noFill/>
+        </p:spPr>
+        <p:txBody>
+          <a:bodyPr wrap="square">
+            <a:spAutoFit/>
+          </a:bodyPr>
+          <a:lstStyle/>
+          <a:p>
+            <a:r>
+              <a:rPr lang="en-US" sz="1800" b="0" i="0" u="none" strike="noStrike" baseline="0" dirty="0">
+                <a:latin typeface="LiberationSerif"/>
+              </a:rPr>
+              <a:t>The intent behind an event could be considered the opposite of a request</a:t>
+            </a:r>
+            <a:endParaRPr lang="en-US" dirty="0"/>
+          </a:p>
+        </p:txBody>
+      </p:sp>
+      <p:sp>
+        <p:nvSpPr>
+          <p:cNvPr id="19" name="TextBox 18">
+            <a:extLst>
+              <a:ext uri="{FF2B5EF4-FFF2-40B4-BE49-F238E27FC236}">
+                <a16:creationId xmlns:a16="http://schemas.microsoft.com/office/drawing/2014/main" id="{5D24024E-2A55-290C-75EA-65241751702B}"/>
+              </a:ext>
+            </a:extLst>
+          </p:cNvPr>
+          <p:cNvSpPr txBox="1"/>
+          <p:nvPr/>
+        </p:nvSpPr>
+        <p:spPr>
+          <a:xfrm>
+            <a:off x="208547" y="4361981"/>
+            <a:ext cx="6096000" cy="923330"/>
+          </a:xfrm>
+          <a:prstGeom prst="rect">
+            <a:avLst/>
+          </a:prstGeom>
+          <a:noFill/>
+        </p:spPr>
+        <p:txBody>
+          <a:bodyPr wrap="square">
+            <a:spAutoFit/>
+          </a:bodyPr>
+          <a:lstStyle/>
+          <a:p>
+            <a:pPr algn="l"/>
+            <a:r>
+              <a:rPr lang="en-US" sz="1800" b="0" i="0" u="none" strike="noStrike" baseline="0" dirty="0">
+                <a:latin typeface="LiberationSerif"/>
+              </a:rPr>
+              <a:t>request-response, the requester has to have knowledge of</a:t>
+            </a:r>
+          </a:p>
+          <a:p>
+            <a:pPr algn="l"/>
+            <a:r>
+              <a:rPr lang="en-US" sz="1800" b="0" i="0" u="none" strike="noStrike" baseline="0" dirty="0">
+                <a:latin typeface="LiberationSerif"/>
+              </a:rPr>
+              <a:t>what the downstream recipient can do, implying a greater degree of domain coupling</a:t>
+            </a:r>
+            <a:endParaRPr lang="en-US" dirty="0"/>
+          </a:p>
+        </p:txBody>
+      </p:sp>
+      <p:sp>
+        <p:nvSpPr>
+          <p:cNvPr id="20" name="TextBox 19">
+            <a:extLst>
+              <a:ext uri="{FF2B5EF4-FFF2-40B4-BE49-F238E27FC236}">
+                <a16:creationId xmlns:a16="http://schemas.microsoft.com/office/drawing/2014/main" id="{06D8C4E9-CBC3-6F8B-5702-8A65E82F6018}"/>
+              </a:ext>
+            </a:extLst>
+          </p:cNvPr>
+          <p:cNvSpPr txBox="1"/>
+          <p:nvPr/>
+        </p:nvSpPr>
+        <p:spPr>
+          <a:xfrm>
+            <a:off x="208547" y="5374514"/>
+            <a:ext cx="6096000" cy="1200329"/>
+          </a:xfrm>
+          <a:prstGeom prst="rect">
+            <a:avLst/>
+          </a:prstGeom>
+          <a:noFill/>
+        </p:spPr>
+        <p:txBody>
+          <a:bodyPr wrap="square">
+            <a:spAutoFit/>
+          </a:bodyPr>
+          <a:lstStyle/>
+          <a:p>
+            <a:pPr algn="l"/>
+            <a:r>
+              <a:rPr lang="en-US" sz="1800" b="0" i="0" u="none" strike="noStrike" baseline="0" dirty="0">
+                <a:latin typeface="LiberationSerif"/>
+              </a:rPr>
+              <a:t>Can reduce centralized knowledge both organizationally and technologically i.e</a:t>
+            </a:r>
+            <a:r>
+              <a:rPr lang="en-US" dirty="0">
+                <a:latin typeface="LiberationSerif"/>
+              </a:rPr>
+              <a:t>., we just publish events and have dedicated microservices that need to know about those events and their side effects</a:t>
+            </a:r>
+            <a:endParaRPr lang="en-US" dirty="0"/>
+          </a:p>
+        </p:txBody>
+      </p:sp>
+      <p:sp>
+        <p:nvSpPr>
+          <p:cNvPr id="22" name="TextBox 21">
+            <a:extLst>
+              <a:ext uri="{FF2B5EF4-FFF2-40B4-BE49-F238E27FC236}">
+                <a16:creationId xmlns:a16="http://schemas.microsoft.com/office/drawing/2014/main" id="{13F64ABE-DC60-8C26-EB74-B251E8885D84}"/>
+              </a:ext>
+            </a:extLst>
+          </p:cNvPr>
+          <p:cNvSpPr txBox="1"/>
+          <p:nvPr/>
+        </p:nvSpPr>
+        <p:spPr>
+          <a:xfrm>
+            <a:off x="6304546" y="3626447"/>
+            <a:ext cx="6096000" cy="369332"/>
+          </a:xfrm>
+          <a:prstGeom prst="rect">
+            <a:avLst/>
+          </a:prstGeom>
+          <a:noFill/>
+        </p:spPr>
+        <p:txBody>
+          <a:bodyPr wrap="square">
+            <a:spAutoFit/>
+          </a:bodyPr>
+          <a:lstStyle/>
+          <a:p>
+            <a:r>
+              <a:rPr lang="en-US" sz="1800" b="1" i="0" u="none" strike="noStrike" baseline="0" dirty="0">
+                <a:latin typeface="LiberationSans-Bold"/>
+              </a:rPr>
+              <a:t>EVENTS AND MESSAGES</a:t>
+            </a:r>
+            <a:endParaRPr lang="en-US" dirty="0"/>
+          </a:p>
+        </p:txBody>
+      </p:sp>
+      <p:sp>
+        <p:nvSpPr>
+          <p:cNvPr id="24" name="TextBox 23">
+            <a:extLst>
+              <a:ext uri="{FF2B5EF4-FFF2-40B4-BE49-F238E27FC236}">
+                <a16:creationId xmlns:a16="http://schemas.microsoft.com/office/drawing/2014/main" id="{B4F259EA-223F-9323-5C5B-E18107E45164}"/>
+              </a:ext>
+            </a:extLst>
+          </p:cNvPr>
+          <p:cNvSpPr txBox="1"/>
+          <p:nvPr/>
+        </p:nvSpPr>
+        <p:spPr>
+          <a:xfrm>
+            <a:off x="6252410" y="4729748"/>
+            <a:ext cx="5731043" cy="646331"/>
+          </a:xfrm>
+          <a:prstGeom prst="rect">
+            <a:avLst/>
+          </a:prstGeom>
+          <a:noFill/>
+        </p:spPr>
+        <p:txBody>
+          <a:bodyPr wrap="square">
+            <a:spAutoFit/>
+          </a:bodyPr>
+          <a:lstStyle/>
+          <a:p>
+            <a:pPr algn="l"/>
+            <a:r>
+              <a:rPr lang="en-US" sz="1800" b="0" i="0" u="none" strike="noStrike" baseline="0" dirty="0">
+                <a:latin typeface="LiberationSerif"/>
+              </a:rPr>
+              <a:t>An event is a fact—a statement that something happened, along with some information about exactly what happened</a:t>
+            </a:r>
+            <a:endParaRPr lang="en-US" dirty="0"/>
+          </a:p>
+        </p:txBody>
+      </p:sp>
+      <p:sp>
+        <p:nvSpPr>
+          <p:cNvPr id="26" name="TextBox 25">
+            <a:extLst>
+              <a:ext uri="{FF2B5EF4-FFF2-40B4-BE49-F238E27FC236}">
+                <a16:creationId xmlns:a16="http://schemas.microsoft.com/office/drawing/2014/main" id="{A868063D-EEFE-5D95-BE09-261051107FA4}"/>
+              </a:ext>
+            </a:extLst>
+          </p:cNvPr>
+          <p:cNvSpPr txBox="1"/>
+          <p:nvPr/>
+        </p:nvSpPr>
+        <p:spPr>
+          <a:xfrm>
+            <a:off x="6304546" y="5465282"/>
+            <a:ext cx="5965658" cy="923330"/>
+          </a:xfrm>
+          <a:prstGeom prst="rect">
+            <a:avLst/>
+          </a:prstGeom>
+          <a:noFill/>
+        </p:spPr>
+        <p:txBody>
+          <a:bodyPr wrap="square">
+            <a:spAutoFit/>
+          </a:bodyPr>
+          <a:lstStyle/>
+          <a:p>
+            <a:pPr algn="l"/>
+            <a:r>
+              <a:rPr lang="en-US" sz="1800" b="0" i="0" u="none" strike="noStrike" baseline="0" dirty="0">
+                <a:latin typeface="LiberationSerif"/>
+              </a:rPr>
+              <a:t>implement that broadcast mechanism would be to put the</a:t>
+            </a:r>
+          </a:p>
+          <a:p>
+            <a:pPr algn="l"/>
+            <a:r>
+              <a:rPr lang="en-US" sz="1800" b="0" i="0" u="none" strike="noStrike" baseline="0" dirty="0">
+                <a:latin typeface="LiberationSerif"/>
+              </a:rPr>
+              <a:t>event into a message. The message is the medium; the event is the payload</a:t>
+            </a:r>
+            <a:endParaRPr lang="en-US" dirty="0"/>
+          </a:p>
+        </p:txBody>
+      </p:sp>
+    </p:spTree>
+    <p:extLst>
+      <p:ext uri="{BB962C8B-B14F-4D97-AF65-F5344CB8AC3E}">
+        <p14:creationId xmlns:p14="http://schemas.microsoft.com/office/powerpoint/2010/main" val="1301230619"/>
+      </p:ext>
+    </p:extLst>
+  </p:cSld>
+  <p:clrMapOvr>
+    <a:masterClrMapping/>
+  </p:clrMapOvr>
+</p:sld>
+</file>
+
+<file path=ppt/slides/slide17.xml><?xml version="1.0" encoding="utf-8"?>
+<p:sld xmlns:a="http://schemas.openxmlformats.org/drawingml/2006/main" xmlns:r="http://schemas.openxmlformats.org/officeDocument/2006/relationships" xmlns:p="http://schemas.openxmlformats.org/presentationml/2006/main">
+  <p:cSld>
+    <p:spTree>
+      <p:nvGrpSpPr>
+        <p:cNvPr id="1" name=""/>
+        <p:cNvGrpSpPr/>
+        <p:nvPr/>
+      </p:nvGrpSpPr>
+      <p:grpSpPr>
+        <a:xfrm>
+          <a:off x="0" y="0"/>
+          <a:ext cx="0" cy="0"/>
+          <a:chOff x="0" y="0"/>
+          <a:chExt cx="0" cy="0"/>
+        </a:xfrm>
+      </p:grpSpPr>
+      <p:sp>
+        <p:nvSpPr>
+          <p:cNvPr id="5" name="TextBox 4">
+            <a:extLst>
+              <a:ext uri="{FF2B5EF4-FFF2-40B4-BE49-F238E27FC236}">
+                <a16:creationId xmlns:a16="http://schemas.microsoft.com/office/drawing/2014/main" id="{D2E6FE57-8E40-5CC7-8E05-7D7FC87B3E6E}"/>
+              </a:ext>
+            </a:extLst>
+          </p:cNvPr>
+          <p:cNvSpPr txBox="1"/>
+          <p:nvPr/>
+        </p:nvSpPr>
+        <p:spPr>
+          <a:xfrm>
+            <a:off x="352926" y="585718"/>
+            <a:ext cx="6096000" cy="369332"/>
+          </a:xfrm>
+          <a:prstGeom prst="rect">
+            <a:avLst/>
+          </a:prstGeom>
+          <a:noFill/>
+        </p:spPr>
+        <p:txBody>
+          <a:bodyPr wrap="square">
+            <a:spAutoFit/>
+          </a:bodyPr>
+          <a:lstStyle/>
+          <a:p>
+            <a:r>
+              <a:rPr lang="en-US" sz="1800" b="1" i="0" u="none" strike="noStrike" baseline="0" dirty="0">
+                <a:latin typeface="LiberationSans-Bold"/>
+              </a:rPr>
+              <a:t>Implementation</a:t>
+            </a:r>
+            <a:endParaRPr lang="en-US" dirty="0"/>
+          </a:p>
+        </p:txBody>
+      </p:sp>
+      <p:sp>
+        <p:nvSpPr>
+          <p:cNvPr id="6" name="TextBox 5">
+            <a:extLst>
+              <a:ext uri="{FF2B5EF4-FFF2-40B4-BE49-F238E27FC236}">
+                <a16:creationId xmlns:a16="http://schemas.microsoft.com/office/drawing/2014/main" id="{842F7EA5-B704-E1E2-9988-84973F4FA1DC}"/>
+              </a:ext>
+            </a:extLst>
+          </p:cNvPr>
+          <p:cNvSpPr txBox="1"/>
+          <p:nvPr/>
+        </p:nvSpPr>
+        <p:spPr>
+          <a:xfrm>
+            <a:off x="352926" y="216386"/>
+            <a:ext cx="6096000" cy="369332"/>
+          </a:xfrm>
+          <a:prstGeom prst="rect">
+            <a:avLst/>
+          </a:prstGeom>
+          <a:noFill/>
+        </p:spPr>
+        <p:txBody>
+          <a:bodyPr wrap="square">
+            <a:spAutoFit/>
+          </a:bodyPr>
+          <a:lstStyle/>
+          <a:p>
+            <a:r>
+              <a:rPr lang="en-US" sz="1800" b="1" i="0" u="none" strike="noStrike" baseline="0" dirty="0">
+                <a:solidFill>
+                  <a:srgbClr val="8F0012"/>
+                </a:solidFill>
+                <a:latin typeface="LiberationSans-Bold"/>
+              </a:rPr>
+              <a:t>Pattern: Event-Driven Communication</a:t>
+            </a:r>
+            <a:endParaRPr lang="en-US" dirty="0"/>
+          </a:p>
+        </p:txBody>
+      </p:sp>
+      <p:sp>
+        <p:nvSpPr>
+          <p:cNvPr id="8" name="TextBox 7">
+            <a:extLst>
+              <a:ext uri="{FF2B5EF4-FFF2-40B4-BE49-F238E27FC236}">
+                <a16:creationId xmlns:a16="http://schemas.microsoft.com/office/drawing/2014/main" id="{4409849A-6E1E-275B-60CC-2AE0EBC7411D}"/>
+              </a:ext>
+            </a:extLst>
+          </p:cNvPr>
+          <p:cNvSpPr txBox="1"/>
+          <p:nvPr/>
+        </p:nvSpPr>
+        <p:spPr>
+          <a:xfrm>
+            <a:off x="352926" y="955050"/>
+            <a:ext cx="6096000" cy="369332"/>
+          </a:xfrm>
+          <a:prstGeom prst="rect">
+            <a:avLst/>
+          </a:prstGeom>
+          <a:noFill/>
+        </p:spPr>
+        <p:txBody>
+          <a:bodyPr wrap="square">
+            <a:spAutoFit/>
+          </a:bodyPr>
+          <a:lstStyle/>
+          <a:p>
+            <a:pPr algn="l"/>
+            <a:r>
+              <a:rPr lang="en-US" sz="1800" b="0" i="0" u="none" strike="noStrike" baseline="0" dirty="0">
+                <a:latin typeface="LiberationSerif"/>
+              </a:rPr>
+              <a:t>way for our</a:t>
+            </a:r>
+            <a:r>
+              <a:rPr lang="en-US" dirty="0">
+                <a:latin typeface="LiberationSerif"/>
+              </a:rPr>
+              <a:t> </a:t>
+            </a:r>
+            <a:r>
+              <a:rPr lang="en-US" sz="1800" b="0" i="0" u="none" strike="noStrike" baseline="0" dirty="0">
+                <a:latin typeface="LiberationSerif"/>
+              </a:rPr>
+              <a:t>microservices to emit events</a:t>
+            </a:r>
+            <a:endParaRPr lang="en-US" dirty="0"/>
+          </a:p>
+        </p:txBody>
+      </p:sp>
+      <p:sp>
+        <p:nvSpPr>
+          <p:cNvPr id="10" name="TextBox 9">
+            <a:extLst>
+              <a:ext uri="{FF2B5EF4-FFF2-40B4-BE49-F238E27FC236}">
+                <a16:creationId xmlns:a16="http://schemas.microsoft.com/office/drawing/2014/main" id="{5E994038-87DF-DB71-EB21-2C0844767FCA}"/>
+              </a:ext>
+            </a:extLst>
+          </p:cNvPr>
+          <p:cNvSpPr txBox="1"/>
+          <p:nvPr/>
+        </p:nvSpPr>
+        <p:spPr>
+          <a:xfrm>
+            <a:off x="352926" y="1324382"/>
+            <a:ext cx="6096000" cy="369332"/>
+          </a:xfrm>
+          <a:prstGeom prst="rect">
+            <a:avLst/>
+          </a:prstGeom>
+          <a:noFill/>
+        </p:spPr>
+        <p:txBody>
+          <a:bodyPr wrap="square">
+            <a:spAutoFit/>
+          </a:bodyPr>
+          <a:lstStyle/>
+          <a:p>
+            <a:pPr algn="l"/>
+            <a:r>
+              <a:rPr lang="en-US" sz="1800" b="0" i="0" u="none" strike="noStrike" baseline="0" dirty="0">
+                <a:latin typeface="LiberationSerif"/>
+              </a:rPr>
+              <a:t>way for our consumers to find out those events have happened</a:t>
+            </a:r>
+            <a:endParaRPr lang="en-US" dirty="0"/>
+          </a:p>
+        </p:txBody>
+      </p:sp>
+      <p:sp>
+        <p:nvSpPr>
+          <p:cNvPr id="12" name="TextBox 11">
+            <a:extLst>
+              <a:ext uri="{FF2B5EF4-FFF2-40B4-BE49-F238E27FC236}">
+                <a16:creationId xmlns:a16="http://schemas.microsoft.com/office/drawing/2014/main" id="{57C5D427-727A-590C-D9C0-53908C51A238}"/>
+              </a:ext>
+            </a:extLst>
+          </p:cNvPr>
+          <p:cNvSpPr txBox="1"/>
+          <p:nvPr/>
+        </p:nvSpPr>
+        <p:spPr>
+          <a:xfrm>
+            <a:off x="352926" y="2063046"/>
+            <a:ext cx="6096000" cy="369332"/>
+          </a:xfrm>
+          <a:prstGeom prst="rect">
+            <a:avLst/>
+          </a:prstGeom>
+          <a:noFill/>
+        </p:spPr>
+        <p:txBody>
+          <a:bodyPr wrap="square">
+            <a:spAutoFit/>
+          </a:bodyPr>
+          <a:lstStyle/>
+          <a:p>
+            <a:r>
+              <a:rPr lang="en-US" sz="1800" b="0" i="1" u="none" strike="noStrike" baseline="0" dirty="0">
+                <a:latin typeface="LiberationSerif"/>
+              </a:rPr>
+              <a:t>message brokers like RabbitMQ try to handle both problems</a:t>
+            </a:r>
+            <a:endParaRPr lang="en-US" i="1" dirty="0"/>
+          </a:p>
+        </p:txBody>
+      </p:sp>
+      <p:sp>
+        <p:nvSpPr>
+          <p:cNvPr id="14" name="TextBox 13">
+            <a:extLst>
+              <a:ext uri="{FF2B5EF4-FFF2-40B4-BE49-F238E27FC236}">
+                <a16:creationId xmlns:a16="http://schemas.microsoft.com/office/drawing/2014/main" id="{48E81709-EBB5-FD6A-51AB-8FB9A63D1FDD}"/>
+              </a:ext>
+            </a:extLst>
+          </p:cNvPr>
+          <p:cNvSpPr txBox="1"/>
+          <p:nvPr/>
+        </p:nvSpPr>
+        <p:spPr>
+          <a:xfrm>
+            <a:off x="352926" y="2801710"/>
+            <a:ext cx="6096000" cy="369332"/>
+          </a:xfrm>
+          <a:prstGeom prst="rect">
+            <a:avLst/>
+          </a:prstGeom>
+          <a:noFill/>
+        </p:spPr>
+        <p:txBody>
+          <a:bodyPr wrap="square">
+            <a:spAutoFit/>
+          </a:bodyPr>
+          <a:lstStyle/>
+          <a:p>
+            <a:r>
+              <a:rPr lang="en-US" sz="1800" b="1" i="0" u="none" strike="noStrike" baseline="0" dirty="0">
+                <a:latin typeface="LiberationSans-Bold"/>
+              </a:rPr>
+              <a:t>What’s in an Event?</a:t>
+            </a:r>
+            <a:endParaRPr lang="en-US" dirty="0"/>
+          </a:p>
+        </p:txBody>
+      </p:sp>
+      <p:pic>
+        <p:nvPicPr>
+          <p:cNvPr id="16" name="Picture 15">
+            <a:extLst>
+              <a:ext uri="{FF2B5EF4-FFF2-40B4-BE49-F238E27FC236}">
+                <a16:creationId xmlns:a16="http://schemas.microsoft.com/office/drawing/2014/main" id="{69AEDB3C-36D1-C17F-8D8B-12601975708B}"/>
+              </a:ext>
+            </a:extLst>
+          </p:cNvPr>
+          <p:cNvPicPr>
+            <a:picLocks noChangeAspect="1"/>
+          </p:cNvPicPr>
+          <p:nvPr/>
+        </p:nvPicPr>
+        <p:blipFill>
+          <a:blip r:embed="rId2"/>
+          <a:stretch>
+            <a:fillRect/>
+          </a:stretch>
+        </p:blipFill>
+        <p:spPr>
+          <a:xfrm>
+            <a:off x="6096000" y="2986376"/>
+            <a:ext cx="5715000" cy="2705100"/>
+          </a:xfrm>
+          <a:prstGeom prst="rect">
+            <a:avLst/>
+          </a:prstGeom>
+        </p:spPr>
+      </p:pic>
+      <p:sp>
+        <p:nvSpPr>
+          <p:cNvPr id="18" name="TextBox 17">
+            <a:extLst>
+              <a:ext uri="{FF2B5EF4-FFF2-40B4-BE49-F238E27FC236}">
+                <a16:creationId xmlns:a16="http://schemas.microsoft.com/office/drawing/2014/main" id="{908D5C5A-66E4-49DA-A2A0-464CC8E34208}"/>
+              </a:ext>
+            </a:extLst>
+          </p:cNvPr>
+          <p:cNvSpPr txBox="1"/>
+          <p:nvPr/>
+        </p:nvSpPr>
+        <p:spPr>
+          <a:xfrm>
+            <a:off x="352926" y="3594626"/>
+            <a:ext cx="6096000" cy="1754326"/>
+          </a:xfrm>
+          <a:prstGeom prst="rect">
+            <a:avLst/>
+          </a:prstGeom>
+          <a:noFill/>
+        </p:spPr>
+        <p:txBody>
+          <a:bodyPr wrap="square">
+            <a:spAutoFit/>
+          </a:bodyPr>
+          <a:lstStyle/>
+          <a:p>
+            <a:pPr algn="l"/>
+            <a:r>
+              <a:rPr lang="en-US" sz="1800" b="0" i="0" u="none" strike="noStrike" baseline="0" dirty="0">
+                <a:latin typeface="LiberationSerif"/>
+              </a:rPr>
+              <a:t>With a request, we are asking a microservice to do something and providing the required information for the requested operation to be carried out. With an event, we are broadcasting a fact that other parties </a:t>
+            </a:r>
+            <a:r>
+              <a:rPr lang="en-US" sz="1800" b="0" i="1" u="none" strike="noStrike" baseline="0" dirty="0">
+                <a:latin typeface="LiberationSerif-Italic"/>
+              </a:rPr>
+              <a:t>might </a:t>
+            </a:r>
+            <a:r>
+              <a:rPr lang="en-US" sz="1800" b="0" i="0" u="none" strike="noStrike" baseline="0" dirty="0">
+                <a:latin typeface="LiberationSerif"/>
+              </a:rPr>
+              <a:t>be interested in, but as the microservice emitting an event can’t and shouldn’t know who receives the event</a:t>
+            </a:r>
+            <a:endParaRPr lang="en-US" dirty="0"/>
+          </a:p>
+        </p:txBody>
+      </p:sp>
+      <p:sp>
+        <p:nvSpPr>
+          <p:cNvPr id="20" name="TextBox 19">
+            <a:extLst>
+              <a:ext uri="{FF2B5EF4-FFF2-40B4-BE49-F238E27FC236}">
+                <a16:creationId xmlns:a16="http://schemas.microsoft.com/office/drawing/2014/main" id="{027276B2-E7D6-D54F-F9A0-044DF879DFAB}"/>
+              </a:ext>
+            </a:extLst>
+          </p:cNvPr>
+          <p:cNvSpPr txBox="1"/>
+          <p:nvPr/>
+        </p:nvSpPr>
+        <p:spPr>
+          <a:xfrm>
+            <a:off x="352926" y="5772536"/>
+            <a:ext cx="6096000" cy="369332"/>
+          </a:xfrm>
+          <a:prstGeom prst="rect">
+            <a:avLst/>
+          </a:prstGeom>
+          <a:noFill/>
+        </p:spPr>
+        <p:txBody>
+          <a:bodyPr wrap="square">
+            <a:spAutoFit/>
+          </a:bodyPr>
+          <a:lstStyle/>
+          <a:p>
+            <a:r>
+              <a:rPr lang="en-US" sz="1800" b="0" i="0" u="none" strike="noStrike" baseline="0" dirty="0">
+                <a:latin typeface="LiberationSerif"/>
+              </a:rPr>
+              <a:t>What, exactly, should be inside the event?</a:t>
+            </a:r>
+            <a:endParaRPr lang="en-US" dirty="0"/>
+          </a:p>
+        </p:txBody>
+      </p:sp>
+    </p:spTree>
+    <p:extLst>
+      <p:ext uri="{BB962C8B-B14F-4D97-AF65-F5344CB8AC3E}">
+        <p14:creationId xmlns:p14="http://schemas.microsoft.com/office/powerpoint/2010/main" val="2261038293"/>
+      </p:ext>
+    </p:extLst>
+  </p:cSld>
+  <p:clrMapOvr>
+    <a:masterClrMapping/>
+  </p:clrMapOvr>
+</p:sld>
+</file>
+
+<file path=ppt/slides/slide18.xml><?xml version="1.0" encoding="utf-8"?>
+<p:sld xmlns:a="http://schemas.openxmlformats.org/drawingml/2006/main" xmlns:r="http://schemas.openxmlformats.org/officeDocument/2006/relationships" xmlns:p="http://schemas.openxmlformats.org/presentationml/2006/main">
+  <p:cSld>
+    <p:spTree>
+      <p:nvGrpSpPr>
+        <p:cNvPr id="1" name=""/>
+        <p:cNvGrpSpPr/>
+        <p:nvPr/>
+      </p:nvGrpSpPr>
+      <p:grpSpPr>
+        <a:xfrm>
+          <a:off x="0" y="0"/>
+          <a:ext cx="0" cy="0"/>
+          <a:chOff x="0" y="0"/>
+          <a:chExt cx="0" cy="0"/>
+        </a:xfrm>
+      </p:grpSpPr>
+      <p:sp>
+        <p:nvSpPr>
+          <p:cNvPr id="5" name="TextBox 4">
+            <a:extLst>
+              <a:ext uri="{FF2B5EF4-FFF2-40B4-BE49-F238E27FC236}">
+                <a16:creationId xmlns:a16="http://schemas.microsoft.com/office/drawing/2014/main" id="{EAC756A6-FA5C-3AEA-44E9-EA1EB6CED39D}"/>
+              </a:ext>
+            </a:extLst>
+          </p:cNvPr>
+          <p:cNvSpPr txBox="1"/>
+          <p:nvPr/>
+        </p:nvSpPr>
+        <p:spPr>
+          <a:xfrm>
+            <a:off x="401053" y="585354"/>
+            <a:ext cx="6096000" cy="369332"/>
+          </a:xfrm>
+          <a:prstGeom prst="rect">
+            <a:avLst/>
+          </a:prstGeom>
+          <a:noFill/>
+        </p:spPr>
+        <p:txBody>
+          <a:bodyPr wrap="square">
+            <a:spAutoFit/>
+          </a:bodyPr>
+          <a:lstStyle/>
+          <a:p>
+            <a:r>
+              <a:rPr lang="en-US" sz="1800" b="1" i="0" u="none" strike="noStrike" baseline="0" dirty="0">
+                <a:solidFill>
+                  <a:srgbClr val="555555"/>
+                </a:solidFill>
+                <a:latin typeface="LiberationSans-Bold"/>
+              </a:rPr>
+              <a:t>Just an ID</a:t>
+            </a:r>
+            <a:endParaRPr lang="en-US" dirty="0"/>
+          </a:p>
+        </p:txBody>
+      </p:sp>
+      <p:sp>
+        <p:nvSpPr>
+          <p:cNvPr id="7" name="TextBox 6">
+            <a:extLst>
+              <a:ext uri="{FF2B5EF4-FFF2-40B4-BE49-F238E27FC236}">
+                <a16:creationId xmlns:a16="http://schemas.microsoft.com/office/drawing/2014/main" id="{5FE29485-7E4E-C898-4BC6-CE37194BE029}"/>
+              </a:ext>
+            </a:extLst>
+          </p:cNvPr>
+          <p:cNvSpPr txBox="1"/>
+          <p:nvPr/>
+        </p:nvSpPr>
+        <p:spPr>
+          <a:xfrm>
+            <a:off x="401053" y="954686"/>
+            <a:ext cx="6096000" cy="369332"/>
+          </a:xfrm>
+          <a:prstGeom prst="rect">
+            <a:avLst/>
+          </a:prstGeom>
+          <a:noFill/>
+        </p:spPr>
+        <p:txBody>
+          <a:bodyPr wrap="square">
+            <a:spAutoFit/>
+          </a:bodyPr>
+          <a:lstStyle/>
+          <a:p>
+            <a:r>
+              <a:rPr lang="en-US" sz="1800" b="0" i="0" u="none" strike="noStrike" baseline="0" dirty="0">
+                <a:latin typeface="LiberationSerif"/>
+              </a:rPr>
+              <a:t>One option is for the event to just contain an identifier</a:t>
+            </a:r>
+            <a:endParaRPr lang="en-US" dirty="0"/>
+          </a:p>
+        </p:txBody>
+      </p:sp>
+      <p:pic>
+        <p:nvPicPr>
+          <p:cNvPr id="9" name="Picture 8">
+            <a:extLst>
+              <a:ext uri="{FF2B5EF4-FFF2-40B4-BE49-F238E27FC236}">
+                <a16:creationId xmlns:a16="http://schemas.microsoft.com/office/drawing/2014/main" id="{4AA23C76-9FAE-9D9E-40BE-5A1E198941EB}"/>
+              </a:ext>
+            </a:extLst>
+          </p:cNvPr>
+          <p:cNvPicPr>
+            <a:picLocks noChangeAspect="1"/>
+          </p:cNvPicPr>
+          <p:nvPr/>
+        </p:nvPicPr>
+        <p:blipFill>
+          <a:blip r:embed="rId2"/>
+          <a:stretch>
+            <a:fillRect/>
+          </a:stretch>
+        </p:blipFill>
+        <p:spPr>
+          <a:xfrm>
+            <a:off x="6096000" y="585354"/>
+            <a:ext cx="5283868" cy="3170321"/>
+          </a:xfrm>
+          <a:prstGeom prst="rect">
+            <a:avLst/>
+          </a:prstGeom>
+        </p:spPr>
+      </p:pic>
+      <p:sp>
+        <p:nvSpPr>
+          <p:cNvPr id="11" name="TextBox 10">
+            <a:extLst>
+              <a:ext uri="{FF2B5EF4-FFF2-40B4-BE49-F238E27FC236}">
+                <a16:creationId xmlns:a16="http://schemas.microsoft.com/office/drawing/2014/main" id="{86D28BA1-D4AF-7EB3-8706-950DA8F40B20}"/>
+              </a:ext>
+            </a:extLst>
+          </p:cNvPr>
+          <p:cNvSpPr txBox="1"/>
+          <p:nvPr/>
+        </p:nvSpPr>
+        <p:spPr>
+          <a:xfrm>
+            <a:off x="401053" y="1324018"/>
+            <a:ext cx="6096000" cy="369332"/>
+          </a:xfrm>
+          <a:prstGeom prst="rect">
+            <a:avLst/>
+          </a:prstGeom>
+          <a:noFill/>
+        </p:spPr>
+        <p:txBody>
+          <a:bodyPr wrap="square">
+            <a:spAutoFit/>
+          </a:bodyPr>
+          <a:lstStyle/>
+          <a:p>
+            <a:r>
+              <a:rPr lang="en-US" sz="1800" b="0" i="0" u="none" strike="noStrike" baseline="0" dirty="0">
+                <a:latin typeface="LiberationSerif"/>
+              </a:rPr>
+              <a:t>There are some downsides with this approach</a:t>
+            </a:r>
+            <a:endParaRPr lang="en-US" dirty="0"/>
+          </a:p>
+        </p:txBody>
+      </p:sp>
+      <p:sp>
+        <p:nvSpPr>
+          <p:cNvPr id="13" name="TextBox 12">
+            <a:extLst>
+              <a:ext uri="{FF2B5EF4-FFF2-40B4-BE49-F238E27FC236}">
+                <a16:creationId xmlns:a16="http://schemas.microsoft.com/office/drawing/2014/main" id="{B09CCA06-E5E9-1686-2075-11F8B7AFEDD6}"/>
+              </a:ext>
+            </a:extLst>
+          </p:cNvPr>
+          <p:cNvSpPr txBox="1"/>
+          <p:nvPr/>
+        </p:nvSpPr>
+        <p:spPr>
+          <a:xfrm>
+            <a:off x="401053" y="1835724"/>
+            <a:ext cx="6096000" cy="369332"/>
+          </a:xfrm>
+          <a:prstGeom prst="rect">
+            <a:avLst/>
+          </a:prstGeom>
+          <a:noFill/>
+        </p:spPr>
+        <p:txBody>
+          <a:bodyPr wrap="square">
+            <a:spAutoFit/>
+          </a:bodyPr>
+          <a:lstStyle/>
+          <a:p>
+            <a:r>
+              <a:rPr lang="en-US" sz="1800" b="1" i="0" u="none" strike="noStrike" baseline="0" dirty="0">
+                <a:solidFill>
+                  <a:srgbClr val="555555"/>
+                </a:solidFill>
+                <a:latin typeface="LiberationSans-Bold"/>
+              </a:rPr>
+              <a:t>Fully detailed events</a:t>
+            </a:r>
+            <a:endParaRPr lang="en-US" dirty="0"/>
+          </a:p>
+        </p:txBody>
+      </p:sp>
+      <p:sp>
+        <p:nvSpPr>
+          <p:cNvPr id="15" name="TextBox 14">
+            <a:extLst>
+              <a:ext uri="{FF2B5EF4-FFF2-40B4-BE49-F238E27FC236}">
+                <a16:creationId xmlns:a16="http://schemas.microsoft.com/office/drawing/2014/main" id="{D0EA765D-64E5-0DB8-FC31-DE3D27603DF8}"/>
+              </a:ext>
+            </a:extLst>
+          </p:cNvPr>
+          <p:cNvSpPr txBox="1"/>
+          <p:nvPr/>
+        </p:nvSpPr>
+        <p:spPr>
+          <a:xfrm>
+            <a:off x="401053" y="2174197"/>
+            <a:ext cx="6096000" cy="646331"/>
+          </a:xfrm>
+          <a:prstGeom prst="rect">
+            <a:avLst/>
+          </a:prstGeom>
+          <a:noFill/>
+        </p:spPr>
+        <p:txBody>
+          <a:bodyPr wrap="square">
+            <a:spAutoFit/>
+          </a:bodyPr>
+          <a:lstStyle/>
+          <a:p>
+            <a:pPr algn="l"/>
+            <a:r>
+              <a:rPr lang="en-US" sz="1800" b="0" i="0" u="none" strike="noStrike" baseline="0" dirty="0">
+                <a:latin typeface="LiberationSerif"/>
+              </a:rPr>
+              <a:t>The alternative, which I prefer, is to put everything into an event that you would be happy otherwise sharing via an API</a:t>
+            </a:r>
+            <a:endParaRPr lang="en-US" dirty="0"/>
+          </a:p>
+        </p:txBody>
+      </p:sp>
+      <p:pic>
+        <p:nvPicPr>
+          <p:cNvPr id="17" name="Picture 16">
+            <a:extLst>
+              <a:ext uri="{FF2B5EF4-FFF2-40B4-BE49-F238E27FC236}">
+                <a16:creationId xmlns:a16="http://schemas.microsoft.com/office/drawing/2014/main" id="{DA73EE7F-D8FB-98B8-AFAB-12841C2BE615}"/>
+              </a:ext>
+            </a:extLst>
+          </p:cNvPr>
+          <p:cNvPicPr>
+            <a:picLocks noChangeAspect="1"/>
+          </p:cNvPicPr>
+          <p:nvPr/>
+        </p:nvPicPr>
+        <p:blipFill>
+          <a:blip r:embed="rId3"/>
+          <a:stretch>
+            <a:fillRect/>
+          </a:stretch>
+        </p:blipFill>
+        <p:spPr>
+          <a:xfrm>
+            <a:off x="6497053" y="4125007"/>
+            <a:ext cx="3863662" cy="2042809"/>
+          </a:xfrm>
+          <a:prstGeom prst="rect">
+            <a:avLst/>
+          </a:prstGeom>
+        </p:spPr>
+      </p:pic>
+      <p:sp>
+        <p:nvSpPr>
+          <p:cNvPr id="19" name="TextBox 18">
+            <a:extLst>
+              <a:ext uri="{FF2B5EF4-FFF2-40B4-BE49-F238E27FC236}">
+                <a16:creationId xmlns:a16="http://schemas.microsoft.com/office/drawing/2014/main" id="{0EA3E5EE-45CB-C158-3916-FFA540A68E47}"/>
+              </a:ext>
+            </a:extLst>
+          </p:cNvPr>
+          <p:cNvSpPr txBox="1"/>
+          <p:nvPr/>
+        </p:nvSpPr>
+        <p:spPr>
+          <a:xfrm>
+            <a:off x="401053" y="2770537"/>
+            <a:ext cx="6096000" cy="1200329"/>
+          </a:xfrm>
+          <a:prstGeom prst="rect">
+            <a:avLst/>
+          </a:prstGeom>
+          <a:noFill/>
+        </p:spPr>
+        <p:txBody>
+          <a:bodyPr wrap="square">
+            <a:spAutoFit/>
+          </a:bodyPr>
+          <a:lstStyle/>
+          <a:p>
+            <a:pPr algn="l"/>
+            <a:r>
+              <a:rPr lang="en-US" sz="1800" b="0" i="0" u="none" strike="noStrike" baseline="0" dirty="0">
+                <a:latin typeface="LiberationSerif"/>
+              </a:rPr>
+              <a:t>In addition to the fact that events with more information can allow for looser coupling, events with more information can also double as a historical record of what happened to a given entity.</a:t>
+            </a:r>
+            <a:endParaRPr lang="en-US" dirty="0"/>
+          </a:p>
+        </p:txBody>
+      </p:sp>
+      <p:sp>
+        <p:nvSpPr>
+          <p:cNvPr id="21" name="TextBox 20">
+            <a:extLst>
+              <a:ext uri="{FF2B5EF4-FFF2-40B4-BE49-F238E27FC236}">
+                <a16:creationId xmlns:a16="http://schemas.microsoft.com/office/drawing/2014/main" id="{570BDEA8-E2C3-8E59-DFDD-148201222A3F}"/>
+              </a:ext>
+            </a:extLst>
+          </p:cNvPr>
+          <p:cNvSpPr txBox="1"/>
+          <p:nvPr/>
+        </p:nvSpPr>
+        <p:spPr>
+          <a:xfrm>
+            <a:off x="401053" y="4114742"/>
+            <a:ext cx="6096000" cy="1477328"/>
+          </a:xfrm>
+          <a:prstGeom prst="rect">
+            <a:avLst/>
+          </a:prstGeom>
+          <a:noFill/>
+        </p:spPr>
+        <p:txBody>
+          <a:bodyPr wrap="square">
+            <a:spAutoFit/>
+          </a:bodyPr>
+          <a:lstStyle/>
+          <a:p>
+            <a:pPr algn="l"/>
+            <a:r>
+              <a:rPr lang="en-US" b="1" dirty="0">
+                <a:latin typeface="LiberationSerif"/>
+              </a:rPr>
+              <a:t>Downsides</a:t>
+            </a:r>
+          </a:p>
+          <a:p>
+            <a:pPr algn="l"/>
+            <a:r>
+              <a:rPr lang="en-US" sz="1800" b="0" i="0" u="none" strike="noStrike" baseline="0" dirty="0">
+                <a:latin typeface="LiberationSerif"/>
+              </a:rPr>
+              <a:t>Firstly, if the data associated with an event is large, we might have concerns about the size of the event (can implement a hybrid approach in that case).  Most message limits range from 1MB (Kafka) – 512MB (RabbitMQ)</a:t>
+            </a:r>
+            <a:endParaRPr lang="en-US" dirty="0"/>
+          </a:p>
+        </p:txBody>
+      </p:sp>
+      <p:sp>
+        <p:nvSpPr>
+          <p:cNvPr id="23" name="TextBox 22">
+            <a:extLst>
+              <a:ext uri="{FF2B5EF4-FFF2-40B4-BE49-F238E27FC236}">
+                <a16:creationId xmlns:a16="http://schemas.microsoft.com/office/drawing/2014/main" id="{AFA675C6-7E28-CE71-1A97-53F0EB1DD17E}"/>
+              </a:ext>
+            </a:extLst>
+          </p:cNvPr>
+          <p:cNvSpPr txBox="1"/>
+          <p:nvPr/>
+        </p:nvSpPr>
+        <p:spPr>
+          <a:xfrm>
+            <a:off x="401053" y="5580148"/>
+            <a:ext cx="6096000" cy="646331"/>
+          </a:xfrm>
+          <a:prstGeom prst="rect">
+            <a:avLst/>
+          </a:prstGeom>
+          <a:noFill/>
+        </p:spPr>
+        <p:txBody>
+          <a:bodyPr wrap="square">
+            <a:spAutoFit/>
+          </a:bodyPr>
+          <a:lstStyle/>
+          <a:p>
+            <a:pPr algn="l"/>
+            <a:r>
+              <a:rPr lang="en-US" sz="1800" b="0" i="0" u="none" strike="noStrike" baseline="0" dirty="0">
+                <a:latin typeface="LiberationSerif"/>
+              </a:rPr>
+              <a:t>Information hiding is still an</a:t>
+            </a:r>
+          </a:p>
+          <a:p>
+            <a:pPr algn="l"/>
+            <a:r>
+              <a:rPr lang="en-US" sz="1800" b="0" i="0" u="none" strike="noStrike" baseline="0" dirty="0">
+                <a:latin typeface="LiberationSerif"/>
+              </a:rPr>
+              <a:t>important concept in event-driven collaboration</a:t>
+            </a:r>
+            <a:endParaRPr lang="en-US" dirty="0"/>
+          </a:p>
+        </p:txBody>
+      </p:sp>
+      <p:sp>
+        <p:nvSpPr>
+          <p:cNvPr id="25" name="TextBox 24">
+            <a:extLst>
+              <a:ext uri="{FF2B5EF4-FFF2-40B4-BE49-F238E27FC236}">
+                <a16:creationId xmlns:a16="http://schemas.microsoft.com/office/drawing/2014/main" id="{F64AC4E3-509F-CD84-BD14-4A991E015F66}"/>
+              </a:ext>
+            </a:extLst>
+          </p:cNvPr>
+          <p:cNvSpPr txBox="1"/>
+          <p:nvPr/>
+        </p:nvSpPr>
+        <p:spPr>
+          <a:xfrm>
+            <a:off x="401053" y="6236899"/>
+            <a:ext cx="6096000" cy="646331"/>
+          </a:xfrm>
+          <a:prstGeom prst="rect">
+            <a:avLst/>
+          </a:prstGeom>
+          <a:noFill/>
+        </p:spPr>
+        <p:txBody>
+          <a:bodyPr wrap="square">
+            <a:spAutoFit/>
+          </a:bodyPr>
+          <a:lstStyle/>
+          <a:p>
+            <a:pPr algn="l"/>
+            <a:r>
+              <a:rPr lang="en-US" sz="1800" b="0" i="0" u="none" strike="noStrike" baseline="0" dirty="0">
+                <a:latin typeface="LiberationSerif"/>
+              </a:rPr>
+              <a:t>OK putting information into an event if I’d be happy</a:t>
+            </a:r>
+          </a:p>
+          <a:p>
+            <a:pPr algn="l"/>
+            <a:r>
+              <a:rPr lang="en-US" sz="1800" b="0" i="0" u="none" strike="noStrike" baseline="0" dirty="0">
+                <a:latin typeface="LiberationSerif"/>
+              </a:rPr>
+              <a:t>sharing the same data over a request-response API</a:t>
+            </a:r>
+            <a:endParaRPr lang="en-US" dirty="0"/>
+          </a:p>
+        </p:txBody>
+      </p:sp>
+      <p:sp>
+        <p:nvSpPr>
+          <p:cNvPr id="26" name="TextBox 25">
+            <a:extLst>
+              <a:ext uri="{FF2B5EF4-FFF2-40B4-BE49-F238E27FC236}">
+                <a16:creationId xmlns:a16="http://schemas.microsoft.com/office/drawing/2014/main" id="{F4F8AA3C-DA33-59D5-B926-A4BF7E360084}"/>
+              </a:ext>
+            </a:extLst>
+          </p:cNvPr>
+          <p:cNvSpPr txBox="1"/>
+          <p:nvPr/>
+        </p:nvSpPr>
+        <p:spPr>
+          <a:xfrm>
+            <a:off x="401053" y="216022"/>
+            <a:ext cx="6096000" cy="369332"/>
+          </a:xfrm>
+          <a:prstGeom prst="rect">
+            <a:avLst/>
+          </a:prstGeom>
+          <a:noFill/>
+        </p:spPr>
+        <p:txBody>
+          <a:bodyPr wrap="square">
+            <a:spAutoFit/>
+          </a:bodyPr>
+          <a:lstStyle/>
+          <a:p>
+            <a:r>
+              <a:rPr lang="en-US" sz="1800" b="1" i="0" u="none" strike="noStrike" baseline="0" dirty="0">
+                <a:solidFill>
+                  <a:srgbClr val="8F0012"/>
+                </a:solidFill>
+                <a:latin typeface="LiberationSans-Bold"/>
+              </a:rPr>
+              <a:t>Pattern: Event-Driven Communication</a:t>
+            </a:r>
+            <a:endParaRPr lang="en-US" dirty="0"/>
+          </a:p>
+        </p:txBody>
+      </p:sp>
+    </p:spTree>
+    <p:extLst>
+      <p:ext uri="{BB962C8B-B14F-4D97-AF65-F5344CB8AC3E}">
+        <p14:creationId xmlns:p14="http://schemas.microsoft.com/office/powerpoint/2010/main" val="4086101147"/>
+      </p:ext>
+    </p:extLst>
+  </p:cSld>
+  <p:clrMapOvr>
+    <a:masterClrMapping/>
+  </p:clrMapOvr>
+</p:sld>
+</file>
+
+<file path=ppt/slides/slide19.xml><?xml version="1.0" encoding="utf-8"?>
+<p:sld xmlns:a="http://schemas.openxmlformats.org/drawingml/2006/main" xmlns:r="http://schemas.openxmlformats.org/officeDocument/2006/relationships" xmlns:p="http://schemas.openxmlformats.org/presentationml/2006/main">
+  <p:cSld>
+    <p:spTree>
+      <p:nvGrpSpPr>
+        <p:cNvPr id="1" name=""/>
+        <p:cNvGrpSpPr/>
+        <p:nvPr/>
+      </p:nvGrpSpPr>
+      <p:grpSpPr>
+        <a:xfrm>
+          <a:off x="0" y="0"/>
+          <a:ext cx="0" cy="0"/>
+          <a:chOff x="0" y="0"/>
+          <a:chExt cx="0" cy="0"/>
+        </a:xfrm>
+      </p:grpSpPr>
+      <p:sp>
+        <p:nvSpPr>
+          <p:cNvPr id="4" name="TextBox 3">
+            <a:extLst>
+              <a:ext uri="{FF2B5EF4-FFF2-40B4-BE49-F238E27FC236}">
+                <a16:creationId xmlns:a16="http://schemas.microsoft.com/office/drawing/2014/main" id="{F5462E7C-350B-EEED-5E11-64CDC8ACBE79}"/>
+              </a:ext>
+            </a:extLst>
+          </p:cNvPr>
+          <p:cNvSpPr txBox="1"/>
+          <p:nvPr/>
+        </p:nvSpPr>
+        <p:spPr>
+          <a:xfrm>
+            <a:off x="352926" y="216386"/>
+            <a:ext cx="6096000" cy="369332"/>
+          </a:xfrm>
+          <a:prstGeom prst="rect">
+            <a:avLst/>
+          </a:prstGeom>
+          <a:noFill/>
+        </p:spPr>
+        <p:txBody>
+          <a:bodyPr wrap="square">
+            <a:spAutoFit/>
+          </a:bodyPr>
+          <a:lstStyle/>
+          <a:p>
+            <a:r>
+              <a:rPr lang="en-US" sz="1800" b="1" i="0" u="none" strike="noStrike" baseline="0" dirty="0">
+                <a:solidFill>
+                  <a:srgbClr val="8F0012"/>
+                </a:solidFill>
+                <a:latin typeface="LiberationSans-Bold"/>
+              </a:rPr>
+              <a:t>Pattern: Event-Driven Communication</a:t>
+            </a:r>
+            <a:endParaRPr lang="en-US" dirty="0"/>
+          </a:p>
+        </p:txBody>
+      </p:sp>
+      <p:sp>
+        <p:nvSpPr>
+          <p:cNvPr id="6" name="TextBox 5">
+            <a:extLst>
+              <a:ext uri="{FF2B5EF4-FFF2-40B4-BE49-F238E27FC236}">
+                <a16:creationId xmlns:a16="http://schemas.microsoft.com/office/drawing/2014/main" id="{13128234-083D-79A3-F49B-F6DE74621DBC}"/>
+              </a:ext>
+            </a:extLst>
+          </p:cNvPr>
+          <p:cNvSpPr txBox="1"/>
+          <p:nvPr/>
+        </p:nvSpPr>
+        <p:spPr>
+          <a:xfrm>
+            <a:off x="352926" y="585718"/>
+            <a:ext cx="6096000" cy="369332"/>
+          </a:xfrm>
+          <a:prstGeom prst="rect">
+            <a:avLst/>
+          </a:prstGeom>
+          <a:noFill/>
+        </p:spPr>
+        <p:txBody>
+          <a:bodyPr wrap="square">
+            <a:spAutoFit/>
+          </a:bodyPr>
+          <a:lstStyle/>
+          <a:p>
+            <a:r>
+              <a:rPr lang="en-US" sz="1800" b="1" i="0" u="none" strike="noStrike" baseline="0" dirty="0">
+                <a:latin typeface="LiberationSans-Bold"/>
+              </a:rPr>
+              <a:t>Where to Use It</a:t>
+            </a:r>
+            <a:endParaRPr lang="en-US" dirty="0"/>
+          </a:p>
+        </p:txBody>
+      </p:sp>
+      <p:sp>
+        <p:nvSpPr>
+          <p:cNvPr id="8" name="TextBox 7">
+            <a:extLst>
+              <a:ext uri="{FF2B5EF4-FFF2-40B4-BE49-F238E27FC236}">
+                <a16:creationId xmlns:a16="http://schemas.microsoft.com/office/drawing/2014/main" id="{CDA0094C-91FB-4083-8503-8F784274C526}"/>
+              </a:ext>
+            </a:extLst>
+          </p:cNvPr>
+          <p:cNvSpPr txBox="1"/>
+          <p:nvPr/>
+        </p:nvSpPr>
+        <p:spPr>
+          <a:xfrm>
+            <a:off x="352926" y="955050"/>
+            <a:ext cx="6096000" cy="923330"/>
+          </a:xfrm>
+          <a:prstGeom prst="rect">
+            <a:avLst/>
+          </a:prstGeom>
+          <a:noFill/>
+        </p:spPr>
+        <p:txBody>
+          <a:bodyPr wrap="square">
+            <a:spAutoFit/>
+          </a:bodyPr>
+          <a:lstStyle/>
+          <a:p>
+            <a:pPr algn="l"/>
+            <a:r>
+              <a:rPr lang="en-US" sz="1800" b="0" i="0" u="none" strike="noStrike" baseline="0" dirty="0">
+                <a:latin typeface="LiberationSerif"/>
+              </a:rPr>
+              <a:t>thrives in situations in which information wants to be</a:t>
+            </a:r>
+          </a:p>
+          <a:p>
+            <a:pPr algn="l"/>
+            <a:r>
+              <a:rPr lang="en-US" sz="1800" b="0" i="0" u="none" strike="noStrike" baseline="0" dirty="0">
+                <a:latin typeface="LiberationSerif"/>
+              </a:rPr>
+              <a:t>broadcast, and in situations in which you are happy to invert intent</a:t>
+            </a:r>
+            <a:endParaRPr lang="en-US" dirty="0"/>
+          </a:p>
+        </p:txBody>
+      </p:sp>
+      <p:sp>
+        <p:nvSpPr>
+          <p:cNvPr id="10" name="TextBox 9">
+            <a:extLst>
+              <a:ext uri="{FF2B5EF4-FFF2-40B4-BE49-F238E27FC236}">
+                <a16:creationId xmlns:a16="http://schemas.microsoft.com/office/drawing/2014/main" id="{00A30D84-2865-E99F-78E6-2A285A3F8841}"/>
+              </a:ext>
+            </a:extLst>
+          </p:cNvPr>
+          <p:cNvSpPr txBox="1"/>
+          <p:nvPr/>
+        </p:nvSpPr>
+        <p:spPr>
+          <a:xfrm>
+            <a:off x="352926" y="1878380"/>
+            <a:ext cx="6096000" cy="369332"/>
+          </a:xfrm>
+          <a:prstGeom prst="rect">
+            <a:avLst/>
+          </a:prstGeom>
+          <a:noFill/>
+        </p:spPr>
+        <p:txBody>
+          <a:bodyPr wrap="square">
+            <a:spAutoFit/>
+          </a:bodyPr>
+          <a:lstStyle/>
+          <a:p>
+            <a:pPr algn="l"/>
+            <a:r>
+              <a:rPr lang="en-US" sz="1800" b="0" i="0" u="none" strike="noStrike" baseline="0" dirty="0">
+                <a:latin typeface="LiberationSerif"/>
+              </a:rPr>
+              <a:t>you are focusing on loose coupling more than other factors</a:t>
+            </a:r>
+            <a:endParaRPr lang="en-US" dirty="0"/>
+          </a:p>
+        </p:txBody>
+      </p:sp>
+      <p:sp>
+        <p:nvSpPr>
+          <p:cNvPr id="12" name="TextBox 11">
+            <a:extLst>
+              <a:ext uri="{FF2B5EF4-FFF2-40B4-BE49-F238E27FC236}">
+                <a16:creationId xmlns:a16="http://schemas.microsoft.com/office/drawing/2014/main" id="{D341C140-0819-EF6B-63EA-6F904CF2F632}"/>
+              </a:ext>
+            </a:extLst>
+          </p:cNvPr>
+          <p:cNvSpPr txBox="1"/>
+          <p:nvPr/>
+        </p:nvSpPr>
+        <p:spPr>
+          <a:xfrm>
+            <a:off x="352926" y="2394297"/>
+            <a:ext cx="6096000" cy="923330"/>
+          </a:xfrm>
+          <a:prstGeom prst="rect">
+            <a:avLst/>
+          </a:prstGeom>
+          <a:noFill/>
+        </p:spPr>
+        <p:txBody>
+          <a:bodyPr wrap="square">
+            <a:spAutoFit/>
+          </a:bodyPr>
+          <a:lstStyle/>
+          <a:p>
+            <a:pPr algn="l"/>
+            <a:r>
+              <a:rPr lang="en-US" sz="1800" b="0" i="0" u="none" strike="noStrike" baseline="0" dirty="0">
+                <a:latin typeface="LiberationSerif"/>
+              </a:rPr>
+              <a:t>often new sources of complexity that come to the fore with this style of collaboration, especially if you’ve had limited exposure to it</a:t>
+            </a:r>
+            <a:endParaRPr lang="en-US" dirty="0"/>
+          </a:p>
+        </p:txBody>
+      </p:sp>
+      <p:sp>
+        <p:nvSpPr>
+          <p:cNvPr id="14" name="TextBox 13">
+            <a:extLst>
+              <a:ext uri="{FF2B5EF4-FFF2-40B4-BE49-F238E27FC236}">
+                <a16:creationId xmlns:a16="http://schemas.microsoft.com/office/drawing/2014/main" id="{41BCAEF5-CC2C-CF07-2551-5E46933BBB55}"/>
+              </a:ext>
+            </a:extLst>
+          </p:cNvPr>
+          <p:cNvSpPr txBox="1"/>
+          <p:nvPr/>
+        </p:nvSpPr>
+        <p:spPr>
+          <a:xfrm>
+            <a:off x="352926" y="3464212"/>
+            <a:ext cx="6096000" cy="646331"/>
+          </a:xfrm>
+          <a:prstGeom prst="rect">
+            <a:avLst/>
+          </a:prstGeom>
+          <a:noFill/>
+        </p:spPr>
+        <p:txBody>
+          <a:bodyPr wrap="square">
+            <a:spAutoFit/>
+          </a:bodyPr>
+          <a:lstStyle/>
+          <a:p>
+            <a:pPr algn="l"/>
+            <a:r>
+              <a:rPr lang="en-US" sz="1800" b="0" i="0" u="none" strike="noStrike" baseline="0" dirty="0">
+                <a:latin typeface="LiberationSerif"/>
+              </a:rPr>
+              <a:t>I see far more teams replacing request-response interactions with event-driven interactions than the reverse</a:t>
+            </a:r>
+            <a:endParaRPr lang="en-US" dirty="0"/>
+          </a:p>
+        </p:txBody>
+      </p:sp>
+      <p:sp>
+        <p:nvSpPr>
+          <p:cNvPr id="16" name="TextBox 15">
+            <a:extLst>
+              <a:ext uri="{FF2B5EF4-FFF2-40B4-BE49-F238E27FC236}">
+                <a16:creationId xmlns:a16="http://schemas.microsoft.com/office/drawing/2014/main" id="{DD71849A-CB96-33AC-066F-060750413F4A}"/>
+              </a:ext>
+            </a:extLst>
+          </p:cNvPr>
+          <p:cNvSpPr txBox="1"/>
+          <p:nvPr/>
+        </p:nvSpPr>
+        <p:spPr>
+          <a:xfrm>
+            <a:off x="352926" y="4257128"/>
+            <a:ext cx="6096000" cy="369332"/>
+          </a:xfrm>
+          <a:prstGeom prst="rect">
+            <a:avLst/>
+          </a:prstGeom>
+          <a:noFill/>
+        </p:spPr>
+        <p:txBody>
+          <a:bodyPr wrap="square">
+            <a:spAutoFit/>
+          </a:bodyPr>
+          <a:lstStyle/>
+          <a:p>
+            <a:r>
+              <a:rPr lang="en-US" sz="1800" b="1" i="0" u="none" strike="noStrike" baseline="0" dirty="0">
+                <a:solidFill>
+                  <a:srgbClr val="8F0012"/>
+                </a:solidFill>
+                <a:latin typeface="LiberationSans-Bold"/>
+              </a:rPr>
+              <a:t>Proceed with Caution</a:t>
+            </a:r>
+            <a:endParaRPr lang="en-US" dirty="0"/>
+          </a:p>
+        </p:txBody>
+      </p:sp>
+      <p:sp>
+        <p:nvSpPr>
+          <p:cNvPr id="18" name="TextBox 17">
+            <a:extLst>
+              <a:ext uri="{FF2B5EF4-FFF2-40B4-BE49-F238E27FC236}">
+                <a16:creationId xmlns:a16="http://schemas.microsoft.com/office/drawing/2014/main" id="{49745292-3BF3-9FA6-7BE3-E16AE6FCC7DB}"/>
+              </a:ext>
+            </a:extLst>
+          </p:cNvPr>
+          <p:cNvSpPr txBox="1"/>
+          <p:nvPr/>
+        </p:nvSpPr>
+        <p:spPr>
+          <a:xfrm>
+            <a:off x="352926" y="4626460"/>
+            <a:ext cx="6096000" cy="646331"/>
+          </a:xfrm>
+          <a:prstGeom prst="rect">
+            <a:avLst/>
+          </a:prstGeom>
+          <a:noFill/>
+        </p:spPr>
+        <p:txBody>
+          <a:bodyPr wrap="square">
+            <a:spAutoFit/>
+          </a:bodyPr>
+          <a:lstStyle/>
+          <a:p>
+            <a:r>
+              <a:rPr lang="en-US" sz="1800" b="0" i="0" u="none" strike="noStrike" baseline="0" dirty="0">
+                <a:latin typeface="LiberationSerif"/>
+              </a:rPr>
+              <a:t>these communication styles do lead to an increase in complexity.</a:t>
+            </a:r>
+            <a:endParaRPr lang="en-US" dirty="0"/>
+          </a:p>
+        </p:txBody>
+      </p:sp>
+      <p:sp>
+        <p:nvSpPr>
+          <p:cNvPr id="20" name="TextBox 19">
+            <a:extLst>
+              <a:ext uri="{FF2B5EF4-FFF2-40B4-BE49-F238E27FC236}">
+                <a16:creationId xmlns:a16="http://schemas.microsoft.com/office/drawing/2014/main" id="{759E0D40-FCE5-D3AA-FA76-7EE59E7BCE79}"/>
+              </a:ext>
+            </a:extLst>
+          </p:cNvPr>
+          <p:cNvSpPr txBox="1"/>
+          <p:nvPr/>
+        </p:nvSpPr>
+        <p:spPr>
+          <a:xfrm>
+            <a:off x="352926" y="5272791"/>
+            <a:ext cx="6096000" cy="1200329"/>
+          </a:xfrm>
+          <a:prstGeom prst="rect">
+            <a:avLst/>
+          </a:prstGeom>
+          <a:noFill/>
+        </p:spPr>
+        <p:txBody>
+          <a:bodyPr wrap="square">
+            <a:spAutoFit/>
+          </a:bodyPr>
+          <a:lstStyle/>
+          <a:p>
+            <a:pPr algn="l"/>
+            <a:r>
+              <a:rPr lang="en-US" sz="1800" b="0" i="0" u="none" strike="noStrike" baseline="0" dirty="0">
+                <a:latin typeface="LiberationSerif"/>
+              </a:rPr>
+              <a:t>Arguably, regarding failure handling, synchronous blocking calls can cause us just as many headaches when it comes to working out if things have happened (or not). It’s just that those headaches may be more familiar to us!</a:t>
+            </a:r>
+            <a:endParaRPr lang="en-US" dirty="0"/>
+          </a:p>
+        </p:txBody>
+      </p:sp>
+      <p:sp>
+        <p:nvSpPr>
+          <p:cNvPr id="22" name="TextBox 21">
+            <a:extLst>
+              <a:ext uri="{FF2B5EF4-FFF2-40B4-BE49-F238E27FC236}">
+                <a16:creationId xmlns:a16="http://schemas.microsoft.com/office/drawing/2014/main" id="{BA1EF1C2-48D8-DE8A-CCAF-55AF3BB01F37}"/>
+              </a:ext>
+            </a:extLst>
+          </p:cNvPr>
+          <p:cNvSpPr txBox="1"/>
+          <p:nvPr/>
+        </p:nvSpPr>
+        <p:spPr>
+          <a:xfrm>
+            <a:off x="6689558" y="6103788"/>
+            <a:ext cx="6096000" cy="369332"/>
+          </a:xfrm>
+          <a:prstGeom prst="rect">
+            <a:avLst/>
+          </a:prstGeom>
+          <a:noFill/>
+        </p:spPr>
+        <p:txBody>
+          <a:bodyPr wrap="square">
+            <a:spAutoFit/>
+          </a:bodyPr>
+          <a:lstStyle/>
+          <a:p>
+            <a:r>
+              <a:rPr lang="en-US" sz="1800" b="1" i="0" u="none" strike="noStrike" baseline="0" dirty="0">
+                <a:latin typeface="LiberationSans-Bold"/>
+              </a:rPr>
+              <a:t>Part II. Implementation…</a:t>
+            </a:r>
+            <a:endParaRPr lang="en-US" dirty="0"/>
+          </a:p>
+        </p:txBody>
+      </p:sp>
+    </p:spTree>
+    <p:extLst>
+      <p:ext uri="{BB962C8B-B14F-4D97-AF65-F5344CB8AC3E}">
+        <p14:creationId xmlns:p14="http://schemas.microsoft.com/office/powerpoint/2010/main" val="1989406895"/>
+      </p:ext>
+    </p:extLst>
+  </p:cSld>
+  <p:clrMapOvr>
+    <a:masterClrMapping/>
+  </p:clrMapOvr>
+</p:sld>
+</file>
+
 <file path=ppt/slides/slide2.xml><?xml version="1.0" encoding="utf-8"?>
 <p:sld xmlns:a="http://schemas.openxmlformats.org/drawingml/2006/main" xmlns:r="http://schemas.openxmlformats.org/officeDocument/2006/relationships" xmlns:p="http://schemas.openxmlformats.org/presentationml/2006/main">
   <p:cSld>

</xml_diff>